<commit_message>
All parts are completed please fix the style
</commit_message>
<xml_diff>
--- a/Project2.pptx
+++ b/Project2.pptx
@@ -33,6 +33,14 @@
     <p:sldId id="279" r:id="rId27"/>
     <p:sldId id="280" r:id="rId28"/>
     <p:sldId id="281" r:id="rId29"/>
+    <p:sldId id="290" r:id="rId30"/>
+    <p:sldId id="283" r:id="rId31"/>
+    <p:sldId id="291" r:id="rId32"/>
+    <p:sldId id="285" r:id="rId33"/>
+    <p:sldId id="292" r:id="rId34"/>
+    <p:sldId id="287" r:id="rId35"/>
+    <p:sldId id="293" r:id="rId36"/>
+    <p:sldId id="294" r:id="rId37"/>
   </p:sldIdLst>
   <p:sldSz cx="12192000" cy="6858000"/>
   <p:notesSz cx="7772400" cy="10058400"/>
@@ -131,6 +139,11 @@
       </a:defRPr>
     </a:lvl9pPr>
   </p:defaultTextStyle>
+  <p:extLst>
+    <p:ext uri="{EFAFB233-063F-42B5-8137-9DF3F51BA10A}">
+      <p15:sldGuideLst xmlns:p15="http://schemas.microsoft.com/office/powerpoint/2012/main"/>
+    </p:ext>
+  </p:extLst>
 </p:presentation>
 </file>
 
@@ -6657,7 +6670,7 @@
               </a:spcBef>
             </a:pPr>
             <a:r>
-              <a:rPr lang="en-US" sz="2400" b="0" strike="noStrike" spc="-1">
+              <a:rPr lang="en-US" sz="2400" b="0" strike="noStrike" spc="-1" dirty="0">
                 <a:solidFill>
                   <a:srgbClr val="000000"/>
                 </a:solidFill>
@@ -6666,7 +6679,7 @@
               </a:rPr>
               <a:t>CSC 201 Section 3, Team 4</a:t>
             </a:r>
-            <a:endParaRPr lang="en-US" sz="2400" b="0" strike="noStrike" spc="-1">
+            <a:endParaRPr lang="en-US" sz="2400" b="0" strike="noStrike" spc="-1" dirty="0">
               <a:latin typeface="Arial"/>
             </a:endParaRPr>
           </a:p>
@@ -6680,16 +6693,26 @@
               </a:spcBef>
             </a:pPr>
             <a:r>
-              <a:rPr lang="en-US" sz="2400" b="0" strike="noStrike" spc="-1">
+              <a:rPr lang="en-US" sz="2400" b="0" strike="noStrike" spc="-1" dirty="0">
                 <a:solidFill>
                   <a:srgbClr val="000000"/>
                 </a:solidFill>
                 <a:latin typeface="Calibri"/>
                 <a:ea typeface="DejaVu Sans"/>
               </a:rPr>
-              <a:t>Alex Nosenko - ??</a:t>
-            </a:r>
-            <a:endParaRPr lang="en-US" sz="2400" b="0" strike="noStrike" spc="-1">
+              <a:t>Alex Nosenko - </a:t>
+            </a:r>
+            <a:r>
+              <a:rPr lang="en-US" sz="2400" b="1" spc="-1" dirty="0">
+                <a:solidFill>
+                  <a:srgbClr val="000000"/>
+                </a:solidFill>
+                <a:latin typeface="Calibri"/>
+                <a:ea typeface="DejaVu Sans"/>
+              </a:rPr>
+              <a:t>OBJ</a:t>
+            </a:r>
+            <a:endParaRPr lang="en-US" sz="2400" b="1" strike="noStrike" spc="-1" dirty="0">
               <a:latin typeface="Arial"/>
             </a:endParaRPr>
           </a:p>
@@ -6703,7 +6726,7 @@
               </a:spcBef>
             </a:pPr>
             <a:r>
-              <a:rPr lang="en-US" sz="2400" b="0" strike="noStrike" spc="-1">
+              <a:rPr lang="en-US" sz="2400" b="0" strike="noStrike" spc="-1" dirty="0">
                 <a:solidFill>
                   <a:srgbClr val="000000"/>
                 </a:solidFill>
@@ -6713,7 +6736,7 @@
               <a:t>Jeffrey Byrnes - </a:t>
             </a:r>
             <a:r>
-              <a:rPr lang="en-US" sz="2400" b="1" strike="noStrike" spc="-1">
+              <a:rPr lang="en-US" sz="2400" b="1" strike="noStrike" spc="-1" dirty="0">
                 <a:solidFill>
                   <a:srgbClr val="000000"/>
                 </a:solidFill>
@@ -6722,7 +6745,7 @@
               </a:rPr>
               <a:t>NUM</a:t>
             </a:r>
-            <a:endParaRPr lang="en-US" sz="2400" b="0" strike="noStrike" spc="-1">
+            <a:endParaRPr lang="en-US" sz="2400" b="0" strike="noStrike" spc="-1" dirty="0">
               <a:latin typeface="Arial"/>
             </a:endParaRPr>
           </a:p>
@@ -6736,7 +6759,7 @@
               </a:spcBef>
             </a:pPr>
             <a:r>
-              <a:rPr lang="en-US" sz="2400" b="0" strike="noStrike" spc="-1">
+              <a:rPr lang="en-US" sz="2400" b="0" strike="noStrike" spc="-1" dirty="0">
                 <a:solidFill>
                   <a:srgbClr val="000000"/>
                 </a:solidFill>
@@ -6746,7 +6769,7 @@
               <a:t>Nitin Nath - </a:t>
             </a:r>
             <a:r>
-              <a:rPr lang="en-US" sz="2400" b="1" strike="noStrike" spc="-1">
+              <a:rPr lang="en-US" sz="2400" b="1" strike="noStrike" spc="-1" dirty="0">
                 <a:solidFill>
                   <a:srgbClr val="000000"/>
                 </a:solidFill>
@@ -6755,7 +6778,7 @@
               </a:rPr>
               <a:t>IDS</a:t>
             </a:r>
-            <a:endParaRPr lang="en-US" sz="2400" b="0" strike="noStrike" spc="-1">
+            <a:endParaRPr lang="en-US" sz="2400" b="0" strike="noStrike" spc="-1" dirty="0">
               <a:latin typeface="Arial"/>
             </a:endParaRPr>
           </a:p>
@@ -6769,7 +6792,7 @@
               </a:spcBef>
             </a:pPr>
             <a:r>
-              <a:rPr lang="en-US" sz="2400" b="0" strike="noStrike" spc="-1">
+              <a:rPr lang="en-US" sz="2400" b="0" strike="noStrike" spc="-1" dirty="0">
                 <a:solidFill>
                   <a:srgbClr val="000000"/>
                 </a:solidFill>
@@ -6779,7 +6802,7 @@
               <a:t>Steven Mackey - </a:t>
             </a:r>
             <a:r>
-              <a:rPr lang="en-US" sz="2400" b="1" strike="noStrike" spc="-1">
+              <a:rPr lang="en-US" sz="2400" b="1" strike="noStrike" spc="-1" dirty="0">
                 <a:solidFill>
                   <a:srgbClr val="000000"/>
                 </a:solidFill>
@@ -6788,7 +6811,7 @@
               </a:rPr>
               <a:t>SEC</a:t>
             </a:r>
-            <a:endParaRPr lang="en-US" sz="2400" b="0" strike="noStrike" spc="-1">
+            <a:endParaRPr lang="en-US" sz="2400" b="0" strike="noStrike" spc="-1" dirty="0">
               <a:latin typeface="Arial"/>
             </a:endParaRPr>
           </a:p>
@@ -11410,16 +11433,15 @@
               </a:lnSpc>
             </a:pPr>
             <a:r>
-              <a:rPr lang="en-US" sz="1800" b="0" strike="noStrike" spc="-1">
+              <a:rPr lang="en-US" spc="-1" dirty="0">
                 <a:solidFill>
                   <a:srgbClr val="000000"/>
                 </a:solidFill>
                 <a:latin typeface="Arial"/>
-                <a:ea typeface="DejaVu Sans"/>
-              </a:rPr>
-              <a:t>Good</a:t>
-            </a:r>
-            <a:endParaRPr lang="en-US" sz="1800" b="0" strike="noStrike" spc="-1">
+              </a:rPr>
+              <a:t>Compliant</a:t>
+            </a:r>
+            <a:endParaRPr lang="en-US" sz="1800" b="0" strike="noStrike" spc="-1" dirty="0">
               <a:latin typeface="Arial"/>
             </a:endParaRPr>
           </a:p>
@@ -11969,16 +11991,15 @@
               </a:lnSpc>
             </a:pPr>
             <a:r>
-              <a:rPr lang="en-US" sz="1800" b="0" strike="noStrike" spc="-1">
+              <a:rPr lang="en-US" spc="-1" dirty="0">
                 <a:solidFill>
                   <a:srgbClr val="000000"/>
                 </a:solidFill>
                 <a:latin typeface="Arial"/>
-                <a:ea typeface="DejaVu Sans"/>
-              </a:rPr>
-              <a:t>Bad</a:t>
-            </a:r>
-            <a:endParaRPr lang="en-US" sz="1800" b="0" strike="noStrike" spc="-1">
+              </a:rPr>
+              <a:t>Noncompliant</a:t>
+            </a:r>
+            <a:endParaRPr lang="en-US" sz="1800" b="0" strike="noStrike" spc="-1" dirty="0">
               <a:latin typeface="Arial"/>
             </a:endParaRPr>
           </a:p>
@@ -12987,16 +13008,15 @@
               </a:lnSpc>
             </a:pPr>
             <a:r>
-              <a:rPr lang="en-US" sz="1800" b="0" strike="noStrike" spc="-1">
+              <a:rPr lang="en-US" spc="-1" dirty="0">
                 <a:solidFill>
                   <a:srgbClr val="000000"/>
                 </a:solidFill>
                 <a:latin typeface="Arial"/>
-                <a:ea typeface="DejaVu Sans"/>
-              </a:rPr>
-              <a:t>Good</a:t>
-            </a:r>
-            <a:endParaRPr lang="en-US" sz="1800" b="0" strike="noStrike" spc="-1">
+              </a:rPr>
+              <a:t>Compliant</a:t>
+            </a:r>
+            <a:endParaRPr lang="en-US" sz="1800" b="0" strike="noStrike" spc="-1" dirty="0">
               <a:latin typeface="Arial"/>
             </a:endParaRPr>
           </a:p>
@@ -13565,16 +13585,15 @@
               </a:lnSpc>
             </a:pPr>
             <a:r>
-              <a:rPr lang="en-US" sz="1800" b="0" strike="noStrike" spc="-1">
+              <a:rPr lang="en-US" spc="-1" dirty="0">
                 <a:solidFill>
                   <a:srgbClr val="000000"/>
                 </a:solidFill>
                 <a:latin typeface="Arial"/>
-                <a:ea typeface="DejaVu Sans"/>
-              </a:rPr>
-              <a:t>Bad</a:t>
-            </a:r>
-            <a:endParaRPr lang="en-US" sz="1800" b="0" strike="noStrike" spc="-1">
+              </a:rPr>
+              <a:t>Noncompliant</a:t>
+            </a:r>
+            <a:endParaRPr lang="en-US" sz="1800" b="0" strike="noStrike" spc="-1" dirty="0">
               <a:latin typeface="Arial"/>
             </a:endParaRPr>
           </a:p>
@@ -15009,16 +15028,15 @@
               </a:lnSpc>
             </a:pPr>
             <a:r>
-              <a:rPr lang="en-US" sz="1800" b="0" strike="noStrike" spc="-1">
+              <a:rPr lang="en-US" spc="-1" dirty="0">
                 <a:solidFill>
                   <a:srgbClr val="000000"/>
                 </a:solidFill>
                 <a:latin typeface="Arial"/>
-                <a:ea typeface="DejaVu Sans"/>
-              </a:rPr>
-              <a:t>Good</a:t>
-            </a:r>
-            <a:endParaRPr lang="en-US" sz="1800" b="0" strike="noStrike" spc="-1">
+              </a:rPr>
+              <a:t>Compliant</a:t>
+            </a:r>
+            <a:endParaRPr lang="en-US" sz="1800" b="0" strike="noStrike" spc="-1" dirty="0">
               <a:latin typeface="Arial"/>
             </a:endParaRPr>
           </a:p>
@@ -15347,16 +15365,15 @@
               </a:lnSpc>
             </a:pPr>
             <a:r>
-              <a:rPr lang="en-US" sz="1800" b="0" strike="noStrike" spc="-1">
+              <a:rPr lang="en-US" spc="-1" dirty="0">
                 <a:solidFill>
                   <a:srgbClr val="000000"/>
                 </a:solidFill>
                 <a:latin typeface="Arial"/>
-                <a:ea typeface="DejaVu Sans"/>
-              </a:rPr>
-              <a:t>Bad</a:t>
-            </a:r>
-            <a:endParaRPr lang="en-US" sz="1800" b="0" strike="noStrike" spc="-1">
+              </a:rPr>
+              <a:t>Noncompliant</a:t>
+            </a:r>
+            <a:endParaRPr lang="en-US" sz="1800" b="0" strike="noStrike" spc="-1" dirty="0">
               <a:latin typeface="Arial"/>
             </a:endParaRPr>
           </a:p>
@@ -15367,6 +15384,895 @@
   <p:clrMapOvr>
     <a:masterClrMapping/>
   </p:clrMapOvr>
+</p:sld>
+</file>
+
+<file path=ppt/slides/slide27.xml><?xml version="1.0" encoding="utf-8"?>
+<p:sld xmlns:a="http://schemas.openxmlformats.org/drawingml/2006/main" xmlns:r="http://schemas.openxmlformats.org/officeDocument/2006/relationships" xmlns:p="http://schemas.openxmlformats.org/presentationml/2006/main">
+  <p:cSld>
+    <p:spTree>
+      <p:nvGrpSpPr>
+        <p:cNvPr id="1" name=""/>
+        <p:cNvGrpSpPr/>
+        <p:nvPr/>
+      </p:nvGrpSpPr>
+      <p:grpSpPr>
+        <a:xfrm>
+          <a:off x="0" y="0"/>
+          <a:ext cx="0" cy="0"/>
+          <a:chOff x="0" y="0"/>
+          <a:chExt cx="0" cy="0"/>
+        </a:xfrm>
+      </p:grpSpPr>
+      <p:sp>
+        <p:nvSpPr>
+          <p:cNvPr id="161" name="TextShape 1"/>
+          <p:cNvSpPr txBox="1"/>
+          <p:nvPr/>
+        </p:nvSpPr>
+        <p:spPr>
+          <a:xfrm>
+            <a:off x="889180" y="446314"/>
+            <a:ext cx="10515240" cy="878846"/>
+          </a:xfrm>
+          <a:prstGeom prst="rect">
+            <a:avLst/>
+          </a:prstGeom>
+          <a:noFill/>
+          <a:ln>
+            <a:noFill/>
+          </a:ln>
+        </p:spPr>
+        <p:txBody>
+          <a:bodyPr anchor="ctr"/>
+          <a:lstStyle/>
+          <a:p>
+            <a:pPr algn="ctr">
+              <a:lnSpc>
+                <a:spcPct val="90000"/>
+              </a:lnSpc>
+            </a:pPr>
+            <a:r>
+              <a:rPr lang="en-US" sz="5400" b="1" strike="noStrike" spc="-1" dirty="0">
+                <a:solidFill>
+                  <a:srgbClr val="222222"/>
+                </a:solidFill>
+                <a:latin typeface="Arial"/>
+              </a:rPr>
+              <a:t>OBJ07-J</a:t>
+            </a:r>
+          </a:p>
+        </p:txBody>
+      </p:sp>
+      <p:sp>
+        <p:nvSpPr>
+          <p:cNvPr id="162" name="TextShape 2"/>
+          <p:cNvSpPr txBox="1"/>
+          <p:nvPr/>
+        </p:nvSpPr>
+        <p:spPr>
+          <a:xfrm>
+            <a:off x="160867" y="1464733"/>
+            <a:ext cx="11971866" cy="4946953"/>
+          </a:xfrm>
+          <a:prstGeom prst="rect">
+            <a:avLst/>
+          </a:prstGeom>
+          <a:solidFill>
+            <a:srgbClr val="FFFFFF"/>
+          </a:solidFill>
+          <a:ln>
+            <a:noFill/>
+          </a:ln>
+        </p:spPr>
+        <p:txBody>
+          <a:bodyPr anchor="ctr"/>
+          <a:lstStyle/>
+          <a:p>
+            <a:pPr>
+              <a:lnSpc>
+                <a:spcPct val="100000"/>
+              </a:lnSpc>
+            </a:pPr>
+            <a:r>
+              <a:rPr lang="en-US" sz="1800" b="1" strike="noStrike" spc="-1" dirty="0">
+                <a:solidFill>
+                  <a:srgbClr val="222222"/>
+                </a:solidFill>
+                <a:latin typeface="Arial"/>
+                <a:ea typeface="DejaVu Sans"/>
+              </a:rPr>
+              <a:t>OBJ07-J</a:t>
+            </a:r>
+            <a:br>
+              <a:rPr lang="en-US" dirty="0"/>
+            </a:br>
+            <a:r>
+              <a:rPr lang="en-US" sz="1800" b="0" u="sng" strike="noStrike" spc="-1" dirty="0">
+                <a:solidFill>
+                  <a:srgbClr val="0563C1"/>
+                </a:solidFill>
+                <a:uFillTx/>
+                <a:latin typeface="Arial"/>
+                <a:ea typeface="DejaVu Sans"/>
+              </a:rPr>
+              <a:t>https://wiki.sei.cmu.edu/confluence/display/java/OBJ07-J.+Sensitive+classes+must+not+let+themselves+be+copied</a:t>
+            </a:r>
+            <a:br>
+              <a:rPr lang="en-US" dirty="0"/>
+            </a:br>
+            <a:endParaRPr lang="en-US" dirty="0"/>
+          </a:p>
+          <a:p>
+            <a:pPr>
+              <a:lnSpc>
+                <a:spcPct val="100000"/>
+              </a:lnSpc>
+            </a:pPr>
+            <a:r>
+              <a:rPr lang="en-US" sz="1800" b="1" strike="noStrike" spc="-1" dirty="0">
+                <a:ea typeface="DejaVu Sans"/>
+              </a:rPr>
+              <a:t>WHAT</a:t>
+            </a:r>
+            <a:r>
+              <a:rPr lang="en-US" sz="1800" b="0" strike="noStrike" spc="-1" dirty="0">
+                <a:ea typeface="DejaVu Sans"/>
+              </a:rPr>
+              <a:t>: </a:t>
+            </a:r>
+            <a:r>
+              <a:rPr lang="en-US" b="0" i="0" dirty="0">
+                <a:effectLst/>
+              </a:rPr>
+              <a:t>Classes containing private, confidential, or sensitive data should not be allowed to be copied. Simply not defining copy mechanisms, is insufficient to prevent copying.</a:t>
+            </a:r>
+            <a:br>
+              <a:rPr lang="en-US" dirty="0"/>
+            </a:br>
+            <a:br>
+              <a:rPr lang="en-US" dirty="0"/>
+            </a:br>
+            <a:r>
+              <a:rPr lang="en-US" sz="1800" b="1" strike="noStrike" spc="-1" dirty="0">
+                <a:solidFill>
+                  <a:srgbClr val="222222"/>
+                </a:solidFill>
+                <a:latin typeface="Arial"/>
+                <a:ea typeface="DejaVu Sans"/>
+              </a:rPr>
+              <a:t>WHY</a:t>
+            </a:r>
+            <a:r>
+              <a:rPr lang="en-US" sz="1800" b="0" strike="noStrike" spc="-1" dirty="0">
+                <a:solidFill>
+                  <a:srgbClr val="222222"/>
+                </a:solidFill>
+                <a:latin typeface="Arial"/>
+                <a:ea typeface="DejaVu Sans"/>
+              </a:rPr>
+              <a:t>: Java's object cloning mechanism allows an attacker to manufacture new instances of a class by copying the memory images of existing objects rather than by executing the class's constructor. This is not the way the objects are normally created. An attacker can misuse the clone feature to manufacture multiple instances of a class and violate the invariants of critical data.</a:t>
+            </a:r>
+            <a:br>
+              <a:rPr lang="en-US" dirty="0"/>
+            </a:br>
+            <a:br>
+              <a:rPr lang="en-US" dirty="0"/>
+            </a:br>
+            <a:r>
+              <a:rPr lang="en-US" sz="1800" b="1" strike="noStrike" spc="-1" dirty="0">
+                <a:solidFill>
+                  <a:srgbClr val="222222"/>
+                </a:solidFill>
+                <a:latin typeface="Arial"/>
+                <a:ea typeface="DejaVu Sans"/>
+              </a:rPr>
+              <a:t>HOW</a:t>
+            </a:r>
+            <a:r>
+              <a:rPr lang="en-US" sz="1800" b="0" strike="noStrike" spc="-1" dirty="0">
+                <a:solidFill>
+                  <a:srgbClr val="222222"/>
+                </a:solidFill>
+                <a:latin typeface="Arial"/>
+                <a:ea typeface="DejaVu Sans"/>
+              </a:rPr>
+              <a:t>: The easiest way to prevent malicious subclasses is to declare class containing sensitive information as </a:t>
+            </a:r>
+            <a:r>
+              <a:rPr lang="en-US" sz="1800" u="sng" strike="noStrike" spc="-1" dirty="0">
+                <a:solidFill>
+                  <a:srgbClr val="222222"/>
+                </a:solidFill>
+                <a:highlight>
+                  <a:srgbClr val="FFFF00"/>
+                </a:highlight>
+                <a:latin typeface="Arial"/>
+                <a:ea typeface="DejaVu Sans"/>
+              </a:rPr>
+              <a:t>final</a:t>
+            </a:r>
+            <a:r>
+              <a:rPr lang="en-US" sz="1800" b="0" strike="noStrike" spc="-1" dirty="0">
+                <a:solidFill>
+                  <a:srgbClr val="222222"/>
+                </a:solidFill>
+                <a:latin typeface="Arial"/>
+                <a:ea typeface="DejaVu Sans"/>
+              </a:rPr>
+              <a:t>.</a:t>
+            </a:r>
+            <a:r>
+              <a:rPr lang="en-US" spc="-1" dirty="0">
+                <a:solidFill>
+                  <a:srgbClr val="222222"/>
+                </a:solidFill>
+                <a:latin typeface="Arial"/>
+                <a:ea typeface="DejaVu Sans"/>
+              </a:rPr>
+              <a:t> Since all the classes inherit </a:t>
+            </a:r>
+            <a:r>
+              <a:rPr lang="en-US" spc="-1" dirty="0">
+                <a:solidFill>
+                  <a:srgbClr val="222222"/>
+                </a:solidFill>
+                <a:highlight>
+                  <a:srgbClr val="FFFF00"/>
+                </a:highlight>
+                <a:latin typeface="Arial"/>
+                <a:ea typeface="DejaVu Sans"/>
+              </a:rPr>
+              <a:t>clone()</a:t>
+            </a:r>
+            <a:r>
+              <a:rPr lang="en-US" spc="-1" dirty="0">
+                <a:solidFill>
+                  <a:srgbClr val="222222"/>
+                </a:solidFill>
+                <a:latin typeface="Arial"/>
+                <a:ea typeface="DejaVu Sans"/>
+              </a:rPr>
+              <a:t> from superclass Object the method clone() should be implemented in a way that it throws exception </a:t>
+            </a:r>
+            <a:r>
+              <a:rPr lang="en-US" sz="1800" b="0" strike="noStrike" spc="-1" dirty="0">
+                <a:solidFill>
+                  <a:srgbClr val="222222"/>
+                </a:solidFill>
+                <a:latin typeface="Arial"/>
+                <a:ea typeface="DejaVu Sans"/>
+              </a:rPr>
+              <a:t> </a:t>
+            </a:r>
+            <a:r>
+              <a:rPr lang="en-US" sz="1800" b="0" u="sng" strike="noStrike" spc="-1" dirty="0" err="1">
+                <a:solidFill>
+                  <a:srgbClr val="222222"/>
+                </a:solidFill>
+                <a:latin typeface="Arial"/>
+                <a:ea typeface="DejaVu Sans"/>
+              </a:rPr>
+              <a:t>CloneNotSupportedException</a:t>
+            </a:r>
+            <a:endParaRPr lang="en-US" sz="1800" strike="noStrike" spc="-1" dirty="0">
+              <a:solidFill>
+                <a:srgbClr val="222222"/>
+              </a:solidFill>
+              <a:latin typeface="Arial"/>
+            </a:endParaRPr>
+          </a:p>
+        </p:txBody>
+      </p:sp>
+    </p:spTree>
+    <p:extLst>
+      <p:ext uri="{BB962C8B-B14F-4D97-AF65-F5344CB8AC3E}">
+        <p14:creationId xmlns:p14="http://schemas.microsoft.com/office/powerpoint/2010/main" val="2206156697"/>
+      </p:ext>
+    </p:extLst>
+  </p:cSld>
+  <p:clrMapOvr>
+    <a:masterClrMapping/>
+  </p:clrMapOvr>
+  <p:timing>
+    <p:tnLst>
+      <p:par>
+        <p:cTn id="1" dur="indefinite" restart="never" nodeType="tmRoot">
+          <p:childTnLst>
+            <p:seq>
+              <p:cTn id="2" dur="indefinite" nodeType="mainSeq"/>
+              <p:prevCondLst>
+                <p:cond evt="onPrev" delay="0">
+                  <p:tgtEl>
+                    <p:sldTgt/>
+                  </p:tgtEl>
+                </p:cond>
+              </p:prevCondLst>
+              <p:nextCondLst>
+                <p:cond evt="onNext" delay="0">
+                  <p:tgtEl>
+                    <p:sldTgt/>
+                  </p:tgtEl>
+                </p:cond>
+              </p:nextCondLst>
+            </p:seq>
+          </p:childTnLst>
+        </p:cTn>
+      </p:par>
+    </p:tnLst>
+  </p:timing>
+</p:sld>
+</file>
+
+<file path=ppt/slides/slide28.xml><?xml version="1.0" encoding="utf-8"?>
+<p:sld xmlns:a="http://schemas.openxmlformats.org/drawingml/2006/main" xmlns:r="http://schemas.openxmlformats.org/officeDocument/2006/relationships" xmlns:p="http://schemas.openxmlformats.org/presentationml/2006/main">
+  <p:cSld>
+    <p:spTree>
+      <p:nvGrpSpPr>
+        <p:cNvPr id="1" name=""/>
+        <p:cNvGrpSpPr/>
+        <p:nvPr/>
+      </p:nvGrpSpPr>
+      <p:grpSpPr>
+        <a:xfrm>
+          <a:off x="0" y="0"/>
+          <a:ext cx="0" cy="0"/>
+          <a:chOff x="0" y="0"/>
+          <a:chExt cx="0" cy="0"/>
+        </a:xfrm>
+      </p:grpSpPr>
+      <p:sp>
+        <p:nvSpPr>
+          <p:cNvPr id="163" name="TextShape 1"/>
+          <p:cNvSpPr txBox="1"/>
+          <p:nvPr/>
+        </p:nvSpPr>
+        <p:spPr>
+          <a:xfrm>
+            <a:off x="-87085" y="415311"/>
+            <a:ext cx="10515240" cy="714375"/>
+          </a:xfrm>
+          <a:prstGeom prst="rect">
+            <a:avLst/>
+          </a:prstGeom>
+          <a:noFill/>
+          <a:ln>
+            <a:noFill/>
+          </a:ln>
+        </p:spPr>
+        <p:txBody>
+          <a:bodyPr anchor="ctr"/>
+          <a:lstStyle/>
+          <a:p>
+            <a:pPr algn="ctr">
+              <a:lnSpc>
+                <a:spcPct val="90000"/>
+              </a:lnSpc>
+            </a:pPr>
+            <a:r>
+              <a:rPr lang="en-US" sz="5400" b="1" strike="noStrike" spc="-1" dirty="0">
+                <a:solidFill>
+                  <a:srgbClr val="222222"/>
+                </a:solidFill>
+                <a:latin typeface="Arial"/>
+              </a:rPr>
+              <a:t>OBJ07-J</a:t>
+            </a:r>
+            <a:endParaRPr lang="en-US" sz="5400" b="1" strike="noStrike" spc="-1" dirty="0">
+              <a:solidFill>
+                <a:srgbClr val="000000"/>
+              </a:solidFill>
+              <a:latin typeface="Calibri"/>
+            </a:endParaRPr>
+          </a:p>
+        </p:txBody>
+      </p:sp>
+      <p:sp>
+        <p:nvSpPr>
+          <p:cNvPr id="3" name="TextBox 2">
+            <a:extLst>
+              <a:ext uri="{FF2B5EF4-FFF2-40B4-BE49-F238E27FC236}">
+                <a16:creationId xmlns:a16="http://schemas.microsoft.com/office/drawing/2014/main" id="{AD2F2219-46FB-491F-8B33-9DD02B523751}"/>
+              </a:ext>
+            </a:extLst>
+          </p:cNvPr>
+          <p:cNvSpPr txBox="1"/>
+          <p:nvPr/>
+        </p:nvSpPr>
+        <p:spPr>
+          <a:xfrm>
+            <a:off x="6638310" y="1129686"/>
+            <a:ext cx="2237015" cy="369332"/>
+          </a:xfrm>
+          <a:prstGeom prst="rect">
+            <a:avLst/>
+          </a:prstGeom>
+          <a:noFill/>
+        </p:spPr>
+        <p:txBody>
+          <a:bodyPr wrap="square" rtlCol="0">
+            <a:spAutoFit/>
+          </a:bodyPr>
+          <a:lstStyle/>
+          <a:p>
+            <a:r>
+              <a:rPr lang="en-US" dirty="0"/>
+              <a:t>Compliant</a:t>
+            </a:r>
+          </a:p>
+        </p:txBody>
+      </p:sp>
+      <p:sp>
+        <p:nvSpPr>
+          <p:cNvPr id="7" name="TextBox 6">
+            <a:extLst>
+              <a:ext uri="{FF2B5EF4-FFF2-40B4-BE49-F238E27FC236}">
+                <a16:creationId xmlns:a16="http://schemas.microsoft.com/office/drawing/2014/main" id="{C5AFD54E-DF92-43AF-A310-5AAFCEDD3640}"/>
+              </a:ext>
+            </a:extLst>
+          </p:cNvPr>
+          <p:cNvSpPr txBox="1"/>
+          <p:nvPr/>
+        </p:nvSpPr>
+        <p:spPr>
+          <a:xfrm>
+            <a:off x="130629" y="1129686"/>
+            <a:ext cx="2237015" cy="369332"/>
+          </a:xfrm>
+          <a:prstGeom prst="rect">
+            <a:avLst/>
+          </a:prstGeom>
+          <a:noFill/>
+        </p:spPr>
+        <p:txBody>
+          <a:bodyPr wrap="square" rtlCol="0">
+            <a:spAutoFit/>
+          </a:bodyPr>
+          <a:lstStyle/>
+          <a:p>
+            <a:r>
+              <a:rPr lang="en-US" dirty="0"/>
+              <a:t>Noncompliant</a:t>
+            </a:r>
+          </a:p>
+        </p:txBody>
+      </p:sp>
+      <p:pic>
+        <p:nvPicPr>
+          <p:cNvPr id="4" name="Picture 3">
+            <a:extLst>
+              <a:ext uri="{FF2B5EF4-FFF2-40B4-BE49-F238E27FC236}">
+                <a16:creationId xmlns:a16="http://schemas.microsoft.com/office/drawing/2014/main" id="{C7BB8268-6ACD-466F-91A6-A9698CE6FB15}"/>
+              </a:ext>
+            </a:extLst>
+          </p:cNvPr>
+          <p:cNvPicPr>
+            <a:picLocks noChangeAspect="1"/>
+          </p:cNvPicPr>
+          <p:nvPr/>
+        </p:nvPicPr>
+        <p:blipFill>
+          <a:blip r:embed="rId2"/>
+          <a:stretch>
+            <a:fillRect/>
+          </a:stretch>
+        </p:blipFill>
+        <p:spPr>
+          <a:xfrm>
+            <a:off x="130629" y="1690200"/>
+            <a:ext cx="6229350" cy="5029200"/>
+          </a:xfrm>
+          <a:prstGeom prst="rect">
+            <a:avLst/>
+          </a:prstGeom>
+        </p:spPr>
+      </p:pic>
+      <p:pic>
+        <p:nvPicPr>
+          <p:cNvPr id="6" name="Picture 5">
+            <a:extLst>
+              <a:ext uri="{FF2B5EF4-FFF2-40B4-BE49-F238E27FC236}">
+                <a16:creationId xmlns:a16="http://schemas.microsoft.com/office/drawing/2014/main" id="{D8224F03-B412-4794-8D02-5303099D8789}"/>
+              </a:ext>
+            </a:extLst>
+          </p:cNvPr>
+          <p:cNvPicPr>
+            <a:picLocks noChangeAspect="1"/>
+          </p:cNvPicPr>
+          <p:nvPr/>
+        </p:nvPicPr>
+        <p:blipFill>
+          <a:blip r:embed="rId3"/>
+          <a:stretch>
+            <a:fillRect/>
+          </a:stretch>
+        </p:blipFill>
+        <p:spPr>
+          <a:xfrm>
+            <a:off x="6638310" y="1690200"/>
+            <a:ext cx="4377081" cy="1334476"/>
+          </a:xfrm>
+          <a:prstGeom prst="rect">
+            <a:avLst/>
+          </a:prstGeom>
+        </p:spPr>
+      </p:pic>
+      <p:pic>
+        <p:nvPicPr>
+          <p:cNvPr id="10" name="Picture 9">
+            <a:extLst>
+              <a:ext uri="{FF2B5EF4-FFF2-40B4-BE49-F238E27FC236}">
+                <a16:creationId xmlns:a16="http://schemas.microsoft.com/office/drawing/2014/main" id="{16662AF1-F647-4DAD-BD9E-183B07EFFE39}"/>
+              </a:ext>
+            </a:extLst>
+          </p:cNvPr>
+          <p:cNvPicPr>
+            <a:picLocks noChangeAspect="1"/>
+          </p:cNvPicPr>
+          <p:nvPr/>
+        </p:nvPicPr>
+        <p:blipFill>
+          <a:blip r:embed="rId4"/>
+          <a:stretch>
+            <a:fillRect/>
+          </a:stretch>
+        </p:blipFill>
+        <p:spPr>
+          <a:xfrm>
+            <a:off x="6638310" y="3429000"/>
+            <a:ext cx="5341403" cy="1534886"/>
+          </a:xfrm>
+          <a:prstGeom prst="rect">
+            <a:avLst/>
+          </a:prstGeom>
+        </p:spPr>
+      </p:pic>
+    </p:spTree>
+    <p:extLst>
+      <p:ext uri="{BB962C8B-B14F-4D97-AF65-F5344CB8AC3E}">
+        <p14:creationId xmlns:p14="http://schemas.microsoft.com/office/powerpoint/2010/main" val="1202316634"/>
+      </p:ext>
+    </p:extLst>
+  </p:cSld>
+  <p:clrMapOvr>
+    <a:masterClrMapping/>
+  </p:clrMapOvr>
+  <p:timing>
+    <p:tnLst>
+      <p:par>
+        <p:cTn id="1" dur="indefinite" restart="never" nodeType="tmRoot">
+          <p:childTnLst>
+            <p:seq>
+              <p:cTn id="2" dur="indefinite" nodeType="mainSeq"/>
+              <p:prevCondLst>
+                <p:cond evt="onPrev" delay="0">
+                  <p:tgtEl>
+                    <p:sldTgt/>
+                  </p:tgtEl>
+                </p:cond>
+              </p:prevCondLst>
+              <p:nextCondLst>
+                <p:cond evt="onNext" delay="0">
+                  <p:tgtEl>
+                    <p:sldTgt/>
+                  </p:tgtEl>
+                </p:cond>
+              </p:nextCondLst>
+            </p:seq>
+          </p:childTnLst>
+        </p:cTn>
+      </p:par>
+    </p:tnLst>
+  </p:timing>
+</p:sld>
+</file>
+
+<file path=ppt/slides/slide29.xml><?xml version="1.0" encoding="utf-8"?>
+<p:sld xmlns:a="http://schemas.openxmlformats.org/drawingml/2006/main" xmlns:r="http://schemas.openxmlformats.org/officeDocument/2006/relationships" xmlns:p="http://schemas.openxmlformats.org/presentationml/2006/main">
+  <p:cSld>
+    <p:spTree>
+      <p:nvGrpSpPr>
+        <p:cNvPr id="1" name=""/>
+        <p:cNvGrpSpPr/>
+        <p:nvPr/>
+      </p:nvGrpSpPr>
+      <p:grpSpPr>
+        <a:xfrm>
+          <a:off x="0" y="0"/>
+          <a:ext cx="0" cy="0"/>
+          <a:chOff x="0" y="0"/>
+          <a:chExt cx="0" cy="0"/>
+        </a:xfrm>
+      </p:grpSpPr>
+      <p:sp>
+        <p:nvSpPr>
+          <p:cNvPr id="161" name="TextShape 1"/>
+          <p:cNvSpPr txBox="1"/>
+          <p:nvPr/>
+        </p:nvSpPr>
+        <p:spPr>
+          <a:xfrm>
+            <a:off x="889180" y="446314"/>
+            <a:ext cx="10515240" cy="878846"/>
+          </a:xfrm>
+          <a:prstGeom prst="rect">
+            <a:avLst/>
+          </a:prstGeom>
+          <a:noFill/>
+          <a:ln>
+            <a:noFill/>
+          </a:ln>
+        </p:spPr>
+        <p:txBody>
+          <a:bodyPr anchor="ctr"/>
+          <a:lstStyle/>
+          <a:p>
+            <a:pPr algn="ctr">
+              <a:lnSpc>
+                <a:spcPct val="90000"/>
+              </a:lnSpc>
+            </a:pPr>
+            <a:r>
+              <a:rPr lang="en-US" sz="5400" b="1" strike="noStrike" spc="-1" dirty="0">
+                <a:solidFill>
+                  <a:srgbClr val="222222"/>
+                </a:solidFill>
+                <a:latin typeface="Arial"/>
+              </a:rPr>
+              <a:t>OBJ08-J</a:t>
+            </a:r>
+          </a:p>
+        </p:txBody>
+      </p:sp>
+      <p:sp>
+        <p:nvSpPr>
+          <p:cNvPr id="162" name="TextShape 2"/>
+          <p:cNvSpPr txBox="1"/>
+          <p:nvPr/>
+        </p:nvSpPr>
+        <p:spPr>
+          <a:xfrm>
+            <a:off x="160867" y="1464733"/>
+            <a:ext cx="11971866" cy="4946953"/>
+          </a:xfrm>
+          <a:prstGeom prst="rect">
+            <a:avLst/>
+          </a:prstGeom>
+          <a:solidFill>
+            <a:srgbClr val="FFFFFF"/>
+          </a:solidFill>
+          <a:ln>
+            <a:noFill/>
+          </a:ln>
+        </p:spPr>
+        <p:txBody>
+          <a:bodyPr anchor="ctr"/>
+          <a:lstStyle/>
+          <a:p>
+            <a:pPr>
+              <a:lnSpc>
+                <a:spcPct val="100000"/>
+              </a:lnSpc>
+            </a:pPr>
+            <a:r>
+              <a:rPr lang="en-US" sz="1800" b="1" strike="noStrike" spc="-1" dirty="0">
+                <a:solidFill>
+                  <a:srgbClr val="222222"/>
+                </a:solidFill>
+                <a:latin typeface="Arial"/>
+                <a:ea typeface="DejaVu Sans"/>
+              </a:rPr>
+              <a:t>OBJ08-J</a:t>
+            </a:r>
+            <a:br>
+              <a:rPr lang="en-US" dirty="0"/>
+            </a:br>
+            <a:r>
+              <a:rPr lang="en-US" sz="1800" b="0" u="sng" strike="noStrike" spc="-1" dirty="0">
+                <a:solidFill>
+                  <a:srgbClr val="0563C1"/>
+                </a:solidFill>
+                <a:uFillTx/>
+                <a:latin typeface="Arial"/>
+                <a:ea typeface="DejaVu Sans"/>
+                <a:hlinkClick r:id="rId2"/>
+              </a:rPr>
+              <a:t>https://wiki.sei.cmu.edu/confluence/display/java/OBJ08-J</a:t>
+            </a:r>
+            <a:r>
+              <a:rPr lang="en-US" sz="1800" b="0" u="sng" strike="noStrike" spc="-1" dirty="0">
+                <a:solidFill>
+                  <a:srgbClr val="0563C1"/>
+                </a:solidFill>
+                <a:uFillTx/>
+                <a:latin typeface="Arial"/>
+                <a:ea typeface="DejaVu Sans"/>
+              </a:rPr>
+              <a:t>.+ </a:t>
+            </a:r>
+            <a:r>
+              <a:rPr lang="en-US" sz="1800" b="0" u="sng" strike="noStrike" spc="-1" dirty="0" err="1">
+                <a:solidFill>
+                  <a:srgbClr val="0563C1"/>
+                </a:solidFill>
+                <a:uFillTx/>
+                <a:latin typeface="Arial"/>
+                <a:ea typeface="DejaVu Sans"/>
+              </a:rPr>
+              <a:t>Do+not+expose+private+members+of+an+outer</a:t>
+            </a:r>
+            <a:r>
+              <a:rPr lang="en-US" sz="1800" b="0" u="sng" strike="noStrike" spc="-1" dirty="0">
+                <a:solidFill>
+                  <a:srgbClr val="0563C1"/>
+                </a:solidFill>
+                <a:uFillTx/>
+                <a:latin typeface="Arial"/>
+                <a:ea typeface="DejaVu Sans"/>
+              </a:rPr>
+              <a:t> + </a:t>
+            </a:r>
+            <a:r>
+              <a:rPr lang="en-US" sz="1800" b="0" u="sng" strike="noStrike" spc="-1" dirty="0" err="1">
+                <a:solidFill>
+                  <a:srgbClr val="0563C1"/>
+                </a:solidFill>
+                <a:uFillTx/>
+                <a:latin typeface="Arial"/>
+                <a:ea typeface="DejaVu Sans"/>
+              </a:rPr>
+              <a:t>class+from+within+a+nested+class</a:t>
+            </a:r>
+            <a:br>
+              <a:rPr lang="en-US" dirty="0"/>
+            </a:br>
+            <a:endParaRPr lang="en-US" dirty="0"/>
+          </a:p>
+          <a:p>
+            <a:pPr>
+              <a:lnSpc>
+                <a:spcPct val="100000"/>
+              </a:lnSpc>
+            </a:pPr>
+            <a:r>
+              <a:rPr lang="en-US" sz="1800" b="1" strike="noStrike" spc="-1" dirty="0">
+                <a:ea typeface="DejaVu Sans"/>
+              </a:rPr>
+              <a:t>WHAT</a:t>
+            </a:r>
+            <a:r>
+              <a:rPr lang="en-US" sz="1800" b="0" strike="noStrike" spc="-1" dirty="0">
+                <a:ea typeface="DejaVu Sans"/>
+              </a:rPr>
+              <a:t>: </a:t>
+            </a:r>
+            <a:r>
+              <a:rPr lang="en-US" sz="1800" strike="noStrike" spc="-1" dirty="0">
+                <a:ea typeface="DejaVu Sans"/>
+              </a:rPr>
+              <a:t>N</a:t>
+            </a:r>
+            <a:r>
+              <a:rPr lang="en-US" b="0" i="0" dirty="0">
+                <a:effectLst/>
+              </a:rPr>
+              <a:t>ested class must not expose the private members of the outer class to external classes or packages.</a:t>
+            </a:r>
+            <a:br>
+              <a:rPr lang="en-US" dirty="0"/>
+            </a:br>
+            <a:br>
+              <a:rPr lang="en-US" dirty="0"/>
+            </a:br>
+            <a:r>
+              <a:rPr lang="en-US" sz="1800" b="1" strike="noStrike" spc="-1" dirty="0">
+                <a:solidFill>
+                  <a:srgbClr val="222222"/>
+                </a:solidFill>
+                <a:latin typeface="Arial"/>
+                <a:ea typeface="DejaVu Sans"/>
+              </a:rPr>
+              <a:t>WHY</a:t>
+            </a:r>
+            <a:r>
+              <a:rPr lang="en-US" sz="1800" b="0" strike="noStrike" spc="-1" dirty="0">
+                <a:solidFill>
+                  <a:srgbClr val="222222"/>
+                </a:solidFill>
+                <a:latin typeface="Arial"/>
+                <a:ea typeface="DejaVu Sans"/>
+              </a:rPr>
+              <a:t>: A nested class is any class whose declaration occurs within the body of another class or interface. The use of a nested class is error prone unless the semantics are well understood. A common notion is that only the nested class may access the contents of the outer class. Not only does the nested class have access to the private fields of the outer class, but the same fields can be accessed by any other class within the package when the nested class is declared public or if it contains public methods or constructors.</a:t>
+            </a:r>
+            <a:br>
+              <a:rPr lang="en-US" dirty="0"/>
+            </a:br>
+            <a:br>
+              <a:rPr lang="en-US" dirty="0"/>
+            </a:br>
+            <a:r>
+              <a:rPr lang="en-US" sz="1800" b="1" strike="noStrike" spc="-1" dirty="0">
+                <a:solidFill>
+                  <a:srgbClr val="222222"/>
+                </a:solidFill>
+                <a:latin typeface="Arial"/>
+                <a:ea typeface="DejaVu Sans"/>
+              </a:rPr>
+              <a:t>HOW</a:t>
+            </a:r>
+            <a:r>
+              <a:rPr lang="en-US" sz="1800" b="0" strike="noStrike" spc="-1" dirty="0">
+                <a:solidFill>
+                  <a:srgbClr val="222222"/>
+                </a:solidFill>
+                <a:latin typeface="Arial"/>
+                <a:ea typeface="DejaVu Sans"/>
+              </a:rPr>
+              <a:t>: Use the </a:t>
+            </a:r>
+            <a:r>
+              <a:rPr lang="en-US" sz="1800" b="0" u="sng" strike="noStrike" spc="-1" dirty="0">
+                <a:solidFill>
+                  <a:srgbClr val="222222"/>
+                </a:solidFill>
+                <a:highlight>
+                  <a:srgbClr val="FFFF00"/>
+                </a:highlight>
+                <a:latin typeface="Arial"/>
+                <a:ea typeface="DejaVu Sans"/>
+              </a:rPr>
+              <a:t>private</a:t>
+            </a:r>
+            <a:r>
+              <a:rPr lang="en-US" sz="1800" b="0" strike="noStrike" spc="-1" dirty="0">
+                <a:solidFill>
+                  <a:srgbClr val="222222"/>
+                </a:solidFill>
+                <a:latin typeface="Arial"/>
+                <a:ea typeface="DejaVu Sans"/>
+              </a:rPr>
+              <a:t> access specifier to hide the inner class and all contained methods and constructors.</a:t>
+            </a:r>
+          </a:p>
+        </p:txBody>
+      </p:sp>
+    </p:spTree>
+    <p:extLst>
+      <p:ext uri="{BB962C8B-B14F-4D97-AF65-F5344CB8AC3E}">
+        <p14:creationId xmlns:p14="http://schemas.microsoft.com/office/powerpoint/2010/main" val="2917303050"/>
+      </p:ext>
+    </p:extLst>
+  </p:cSld>
+  <p:clrMapOvr>
+    <a:masterClrMapping/>
+  </p:clrMapOvr>
+  <p:timing>
+    <p:tnLst>
+      <p:par>
+        <p:cTn id="1" dur="indefinite" restart="never" nodeType="tmRoot">
+          <p:childTnLst>
+            <p:seq>
+              <p:cTn id="2" dur="indefinite" nodeType="mainSeq"/>
+              <p:prevCondLst>
+                <p:cond evt="onPrev" delay="0">
+                  <p:tgtEl>
+                    <p:sldTgt/>
+                  </p:tgtEl>
+                </p:cond>
+              </p:prevCondLst>
+              <p:nextCondLst>
+                <p:cond evt="onNext" delay="0">
+                  <p:tgtEl>
+                    <p:sldTgt/>
+                  </p:tgtEl>
+                </p:cond>
+              </p:nextCondLst>
+            </p:seq>
+          </p:childTnLst>
+        </p:cTn>
+      </p:par>
+    </p:tnLst>
+  </p:timing>
 </p:sld>
 </file>
 
@@ -17691,6 +18597,1605 @@
 </p:sld>
 </file>
 
+<file path=ppt/slides/slide30.xml><?xml version="1.0" encoding="utf-8"?>
+<p:sld xmlns:a="http://schemas.openxmlformats.org/drawingml/2006/main" xmlns:r="http://schemas.openxmlformats.org/officeDocument/2006/relationships" xmlns:p="http://schemas.openxmlformats.org/presentationml/2006/main">
+  <p:cSld>
+    <p:spTree>
+      <p:nvGrpSpPr>
+        <p:cNvPr id="1" name=""/>
+        <p:cNvGrpSpPr/>
+        <p:nvPr/>
+      </p:nvGrpSpPr>
+      <p:grpSpPr>
+        <a:xfrm>
+          <a:off x="0" y="0"/>
+          <a:ext cx="0" cy="0"/>
+          <a:chOff x="0" y="0"/>
+          <a:chExt cx="0" cy="0"/>
+        </a:xfrm>
+      </p:grpSpPr>
+      <p:sp>
+        <p:nvSpPr>
+          <p:cNvPr id="163" name="TextShape 1"/>
+          <p:cNvSpPr txBox="1"/>
+          <p:nvPr/>
+        </p:nvSpPr>
+        <p:spPr>
+          <a:xfrm>
+            <a:off x="208509" y="413657"/>
+            <a:ext cx="10515240" cy="688714"/>
+          </a:xfrm>
+          <a:prstGeom prst="rect">
+            <a:avLst/>
+          </a:prstGeom>
+          <a:noFill/>
+          <a:ln>
+            <a:noFill/>
+          </a:ln>
+        </p:spPr>
+        <p:txBody>
+          <a:bodyPr anchor="ctr"/>
+          <a:lstStyle/>
+          <a:p>
+            <a:pPr algn="ctr">
+              <a:lnSpc>
+                <a:spcPct val="90000"/>
+              </a:lnSpc>
+            </a:pPr>
+            <a:r>
+              <a:rPr lang="en-US" sz="5400" b="1" strike="noStrike" spc="-1" dirty="0">
+                <a:solidFill>
+                  <a:srgbClr val="222222"/>
+                </a:solidFill>
+                <a:latin typeface="Arial"/>
+              </a:rPr>
+              <a:t>OBJ08-J</a:t>
+            </a:r>
+            <a:endParaRPr lang="en-US" sz="5400" b="1" strike="noStrike" spc="-1" dirty="0">
+              <a:solidFill>
+                <a:srgbClr val="000000"/>
+              </a:solidFill>
+              <a:latin typeface="Calibri"/>
+            </a:endParaRPr>
+          </a:p>
+        </p:txBody>
+      </p:sp>
+      <p:sp>
+        <p:nvSpPr>
+          <p:cNvPr id="3" name="TextBox 2">
+            <a:extLst>
+              <a:ext uri="{FF2B5EF4-FFF2-40B4-BE49-F238E27FC236}">
+                <a16:creationId xmlns:a16="http://schemas.microsoft.com/office/drawing/2014/main" id="{AD2F2219-46FB-491F-8B33-9DD02B523751}"/>
+              </a:ext>
+            </a:extLst>
+          </p:cNvPr>
+          <p:cNvSpPr txBox="1"/>
+          <p:nvPr/>
+        </p:nvSpPr>
+        <p:spPr>
+          <a:xfrm>
+            <a:off x="5916345" y="1240204"/>
+            <a:ext cx="2237015" cy="369332"/>
+          </a:xfrm>
+          <a:prstGeom prst="rect">
+            <a:avLst/>
+          </a:prstGeom>
+          <a:noFill/>
+        </p:spPr>
+        <p:txBody>
+          <a:bodyPr wrap="square" rtlCol="0">
+            <a:spAutoFit/>
+          </a:bodyPr>
+          <a:lstStyle/>
+          <a:p>
+            <a:r>
+              <a:rPr lang="en-US" dirty="0"/>
+              <a:t>Compliant</a:t>
+            </a:r>
+          </a:p>
+        </p:txBody>
+      </p:sp>
+      <p:sp>
+        <p:nvSpPr>
+          <p:cNvPr id="7" name="TextBox 6">
+            <a:extLst>
+              <a:ext uri="{FF2B5EF4-FFF2-40B4-BE49-F238E27FC236}">
+                <a16:creationId xmlns:a16="http://schemas.microsoft.com/office/drawing/2014/main" id="{C5AFD54E-DF92-43AF-A310-5AAFCEDD3640}"/>
+              </a:ext>
+            </a:extLst>
+          </p:cNvPr>
+          <p:cNvSpPr txBox="1"/>
+          <p:nvPr/>
+        </p:nvSpPr>
+        <p:spPr>
+          <a:xfrm>
+            <a:off x="143435" y="1240204"/>
+            <a:ext cx="2237015" cy="369332"/>
+          </a:xfrm>
+          <a:prstGeom prst="rect">
+            <a:avLst/>
+          </a:prstGeom>
+          <a:noFill/>
+        </p:spPr>
+        <p:txBody>
+          <a:bodyPr wrap="square" rtlCol="0">
+            <a:spAutoFit/>
+          </a:bodyPr>
+          <a:lstStyle/>
+          <a:p>
+            <a:r>
+              <a:rPr lang="en-US" dirty="0"/>
+              <a:t>Noncompliant</a:t>
+            </a:r>
+          </a:p>
+        </p:txBody>
+      </p:sp>
+      <p:pic>
+        <p:nvPicPr>
+          <p:cNvPr id="4" name="Picture 3">
+            <a:extLst>
+              <a:ext uri="{FF2B5EF4-FFF2-40B4-BE49-F238E27FC236}">
+                <a16:creationId xmlns:a16="http://schemas.microsoft.com/office/drawing/2014/main" id="{E3B9B17E-F9A3-4679-9E0F-10CD1ECEB09D}"/>
+              </a:ext>
+            </a:extLst>
+          </p:cNvPr>
+          <p:cNvPicPr>
+            <a:picLocks noChangeAspect="1"/>
+          </p:cNvPicPr>
+          <p:nvPr/>
+        </p:nvPicPr>
+        <p:blipFill>
+          <a:blip r:embed="rId2"/>
+          <a:stretch>
+            <a:fillRect/>
+          </a:stretch>
+        </p:blipFill>
+        <p:spPr>
+          <a:xfrm>
+            <a:off x="143435" y="1726366"/>
+            <a:ext cx="5571445" cy="5015656"/>
+          </a:xfrm>
+          <a:prstGeom prst="rect">
+            <a:avLst/>
+          </a:prstGeom>
+        </p:spPr>
+      </p:pic>
+      <p:pic>
+        <p:nvPicPr>
+          <p:cNvPr id="6" name="Picture 5">
+            <a:extLst>
+              <a:ext uri="{FF2B5EF4-FFF2-40B4-BE49-F238E27FC236}">
+                <a16:creationId xmlns:a16="http://schemas.microsoft.com/office/drawing/2014/main" id="{FE27A574-675C-45D5-8A80-E83AE74B699D}"/>
+              </a:ext>
+            </a:extLst>
+          </p:cNvPr>
+          <p:cNvPicPr>
+            <a:picLocks noChangeAspect="1"/>
+          </p:cNvPicPr>
+          <p:nvPr/>
+        </p:nvPicPr>
+        <p:blipFill>
+          <a:blip r:embed="rId3"/>
+          <a:stretch>
+            <a:fillRect/>
+          </a:stretch>
+        </p:blipFill>
+        <p:spPr>
+          <a:xfrm>
+            <a:off x="5916345" y="1726366"/>
+            <a:ext cx="6051567" cy="4380523"/>
+          </a:xfrm>
+          <a:prstGeom prst="rect">
+            <a:avLst/>
+          </a:prstGeom>
+        </p:spPr>
+      </p:pic>
+    </p:spTree>
+    <p:extLst>
+      <p:ext uri="{BB962C8B-B14F-4D97-AF65-F5344CB8AC3E}">
+        <p14:creationId xmlns:p14="http://schemas.microsoft.com/office/powerpoint/2010/main" val="1132146584"/>
+      </p:ext>
+    </p:extLst>
+  </p:cSld>
+  <p:clrMapOvr>
+    <a:masterClrMapping/>
+  </p:clrMapOvr>
+  <p:timing>
+    <p:tnLst>
+      <p:par>
+        <p:cTn id="1" dur="indefinite" restart="never" nodeType="tmRoot">
+          <p:childTnLst>
+            <p:seq>
+              <p:cTn id="2" dur="indefinite" nodeType="mainSeq"/>
+              <p:prevCondLst>
+                <p:cond evt="onPrev" delay="0">
+                  <p:tgtEl>
+                    <p:sldTgt/>
+                  </p:tgtEl>
+                </p:cond>
+              </p:prevCondLst>
+              <p:nextCondLst>
+                <p:cond evt="onNext" delay="0">
+                  <p:tgtEl>
+                    <p:sldTgt/>
+                  </p:tgtEl>
+                </p:cond>
+              </p:nextCondLst>
+            </p:seq>
+          </p:childTnLst>
+        </p:cTn>
+      </p:par>
+    </p:tnLst>
+  </p:timing>
+</p:sld>
+</file>
+
+<file path=ppt/slides/slide31.xml><?xml version="1.0" encoding="utf-8"?>
+<p:sld xmlns:a="http://schemas.openxmlformats.org/drawingml/2006/main" xmlns:r="http://schemas.openxmlformats.org/officeDocument/2006/relationships" xmlns:p="http://schemas.openxmlformats.org/presentationml/2006/main">
+  <p:cSld>
+    <p:spTree>
+      <p:nvGrpSpPr>
+        <p:cNvPr id="1" name=""/>
+        <p:cNvGrpSpPr/>
+        <p:nvPr/>
+      </p:nvGrpSpPr>
+      <p:grpSpPr>
+        <a:xfrm>
+          <a:off x="0" y="0"/>
+          <a:ext cx="0" cy="0"/>
+          <a:chOff x="0" y="0"/>
+          <a:chExt cx="0" cy="0"/>
+        </a:xfrm>
+      </p:grpSpPr>
+      <p:sp>
+        <p:nvSpPr>
+          <p:cNvPr id="161" name="TextShape 1"/>
+          <p:cNvSpPr txBox="1"/>
+          <p:nvPr/>
+        </p:nvSpPr>
+        <p:spPr>
+          <a:xfrm>
+            <a:off x="889180" y="446314"/>
+            <a:ext cx="10515240" cy="878846"/>
+          </a:xfrm>
+          <a:prstGeom prst="rect">
+            <a:avLst/>
+          </a:prstGeom>
+          <a:noFill/>
+          <a:ln>
+            <a:noFill/>
+          </a:ln>
+        </p:spPr>
+        <p:txBody>
+          <a:bodyPr anchor="ctr"/>
+          <a:lstStyle/>
+          <a:p>
+            <a:pPr algn="ctr">
+              <a:lnSpc>
+                <a:spcPct val="90000"/>
+              </a:lnSpc>
+            </a:pPr>
+            <a:r>
+              <a:rPr lang="en-US" sz="5400" b="1" strike="noStrike" spc="-1" dirty="0">
+                <a:solidFill>
+                  <a:srgbClr val="222222"/>
+                </a:solidFill>
+                <a:latin typeface="Arial"/>
+              </a:rPr>
+              <a:t>OBJ56-J</a:t>
+            </a:r>
+          </a:p>
+        </p:txBody>
+      </p:sp>
+      <p:sp>
+        <p:nvSpPr>
+          <p:cNvPr id="162" name="TextShape 2"/>
+          <p:cNvSpPr txBox="1"/>
+          <p:nvPr/>
+        </p:nvSpPr>
+        <p:spPr>
+          <a:xfrm>
+            <a:off x="160867" y="1464733"/>
+            <a:ext cx="11971866" cy="4946953"/>
+          </a:xfrm>
+          <a:prstGeom prst="rect">
+            <a:avLst/>
+          </a:prstGeom>
+          <a:solidFill>
+            <a:srgbClr val="FFFFFF"/>
+          </a:solidFill>
+          <a:ln>
+            <a:noFill/>
+          </a:ln>
+        </p:spPr>
+        <p:txBody>
+          <a:bodyPr anchor="ctr"/>
+          <a:lstStyle/>
+          <a:p>
+            <a:pPr>
+              <a:lnSpc>
+                <a:spcPct val="100000"/>
+              </a:lnSpc>
+            </a:pPr>
+            <a:r>
+              <a:rPr lang="en-US" sz="1800" b="1" strike="noStrike" spc="-1" dirty="0">
+                <a:solidFill>
+                  <a:srgbClr val="222222"/>
+                </a:solidFill>
+                <a:latin typeface="Arial"/>
+                <a:ea typeface="DejaVu Sans"/>
+              </a:rPr>
+              <a:t>OBJ56-J</a:t>
+            </a:r>
+            <a:br>
+              <a:rPr lang="en-US" dirty="0"/>
+            </a:br>
+            <a:r>
+              <a:rPr lang="en-US" sz="1800" b="0" u="sng" strike="noStrike" spc="-1" dirty="0">
+                <a:solidFill>
+                  <a:srgbClr val="0563C1"/>
+                </a:solidFill>
+                <a:uFillTx/>
+                <a:latin typeface="Arial"/>
+                <a:ea typeface="DejaVu Sans"/>
+                <a:hlinkClick r:id="rId2"/>
+              </a:rPr>
+              <a:t>https://wiki.sei.cmu.edu/confluence/display/java/OBJ56-J.+Provide</a:t>
+            </a:r>
+            <a:r>
+              <a:rPr lang="en-US" sz="1800" b="0" u="sng" strike="noStrike" spc="-1" dirty="0">
+                <a:solidFill>
+                  <a:srgbClr val="0563C1"/>
+                </a:solidFill>
+                <a:uFillTx/>
+                <a:latin typeface="Arial"/>
+                <a:ea typeface="DejaVu Sans"/>
+              </a:rPr>
+              <a:t>+ </a:t>
+            </a:r>
+            <a:r>
+              <a:rPr lang="en-US" sz="1800" b="0" u="sng" strike="noStrike" spc="-1" dirty="0" err="1">
+                <a:solidFill>
+                  <a:srgbClr val="0563C1"/>
+                </a:solidFill>
+                <a:uFillTx/>
+                <a:latin typeface="Arial"/>
+                <a:ea typeface="DejaVu Sans"/>
+              </a:rPr>
+              <a:t>sensitive+mutable+classes+with</a:t>
+            </a:r>
+            <a:r>
+              <a:rPr lang="en-US" sz="1800" b="0" u="sng" strike="noStrike" spc="-1" dirty="0">
+                <a:solidFill>
+                  <a:srgbClr val="0563C1"/>
+                </a:solidFill>
+                <a:uFillTx/>
+                <a:latin typeface="Arial"/>
+                <a:ea typeface="DejaVu Sans"/>
+              </a:rPr>
+              <a:t>+ unmodifiable + wrappers</a:t>
+            </a:r>
+            <a:br>
+              <a:rPr lang="en-US" dirty="0"/>
+            </a:br>
+            <a:endParaRPr lang="en-US" dirty="0"/>
+          </a:p>
+          <a:p>
+            <a:pPr>
+              <a:lnSpc>
+                <a:spcPct val="100000"/>
+              </a:lnSpc>
+            </a:pPr>
+            <a:r>
+              <a:rPr lang="en-US" sz="1800" b="1" strike="noStrike" spc="-1" dirty="0">
+                <a:ea typeface="DejaVu Sans"/>
+              </a:rPr>
+              <a:t>WHAT</a:t>
+            </a:r>
+            <a:r>
+              <a:rPr lang="en-US" sz="1800" b="0" strike="noStrike" spc="-1" dirty="0">
+                <a:ea typeface="DejaVu Sans"/>
+              </a:rPr>
+              <a:t>: Read-only access to mutable classes can be granted to untrusted code using unmodifiable wrappers</a:t>
+            </a:r>
+            <a:br>
+              <a:rPr lang="en-US" dirty="0"/>
+            </a:br>
+            <a:br>
+              <a:rPr lang="en-US" dirty="0"/>
+            </a:br>
+            <a:r>
+              <a:rPr lang="en-US" sz="1800" b="1" strike="noStrike" spc="-1" dirty="0">
+                <a:solidFill>
+                  <a:srgbClr val="222222"/>
+                </a:solidFill>
+                <a:latin typeface="Arial"/>
+                <a:ea typeface="DejaVu Sans"/>
+              </a:rPr>
+              <a:t>WHY</a:t>
+            </a:r>
+            <a:r>
+              <a:rPr lang="en-US" sz="1800" b="0" strike="noStrike" spc="-1" dirty="0">
+                <a:solidFill>
+                  <a:srgbClr val="222222"/>
+                </a:solidFill>
+                <a:latin typeface="Arial"/>
+                <a:ea typeface="DejaVu Sans"/>
+              </a:rPr>
+              <a:t>: Immutability of fields prevents inadvertent modification as well as malicious tampering so that defensive copying while accepting input or returning values is unnecessary. However, some sensitive classes cannot be immutable. A malicious invoker may call the setter method in attempt to modify the objects.</a:t>
+            </a:r>
+            <a:br>
+              <a:rPr lang="en-US" dirty="0"/>
+            </a:br>
+            <a:br>
+              <a:rPr lang="en-US" dirty="0"/>
+            </a:br>
+            <a:r>
+              <a:rPr lang="en-US" sz="1800" b="1" strike="noStrike" spc="-1" dirty="0">
+                <a:solidFill>
+                  <a:srgbClr val="222222"/>
+                </a:solidFill>
+                <a:latin typeface="Arial"/>
+                <a:ea typeface="DejaVu Sans"/>
+              </a:rPr>
+              <a:t>HOW</a:t>
+            </a:r>
+            <a:r>
+              <a:rPr lang="en-US" sz="1800" b="0" strike="noStrike" spc="-1" dirty="0">
+                <a:solidFill>
+                  <a:srgbClr val="222222"/>
+                </a:solidFill>
+                <a:latin typeface="Arial"/>
+                <a:ea typeface="DejaVu Sans"/>
+              </a:rPr>
+              <a:t>: To prevent misuse of </a:t>
+            </a:r>
+            <a:r>
+              <a:rPr lang="en-US" spc="-1" dirty="0">
+                <a:solidFill>
+                  <a:srgbClr val="222222"/>
+                </a:solidFill>
+                <a:latin typeface="Arial"/>
+                <a:ea typeface="DejaVu Sans"/>
+              </a:rPr>
+              <a:t>the mutator methods they must be overridden in a way that throws exception on invocation (</a:t>
+            </a:r>
+            <a:r>
+              <a:rPr lang="en-US" sz="1800" b="0" strike="noStrike" spc="-1" dirty="0" err="1">
+                <a:solidFill>
+                  <a:srgbClr val="222222"/>
+                </a:solidFill>
+                <a:latin typeface="Arial"/>
+                <a:ea typeface="DejaVu Sans"/>
+              </a:rPr>
+              <a:t>UnsupportedOperationException</a:t>
+            </a:r>
+            <a:r>
+              <a:rPr lang="en-US" sz="1800" b="0" strike="noStrike" spc="-1" dirty="0">
+                <a:solidFill>
+                  <a:srgbClr val="222222"/>
+                </a:solidFill>
+                <a:latin typeface="Arial"/>
+                <a:ea typeface="DejaVu Sans"/>
+              </a:rPr>
+              <a:t>()). This will prevent modification of the private internal state of the class.</a:t>
+            </a:r>
+          </a:p>
+        </p:txBody>
+      </p:sp>
+    </p:spTree>
+    <p:extLst>
+      <p:ext uri="{BB962C8B-B14F-4D97-AF65-F5344CB8AC3E}">
+        <p14:creationId xmlns:p14="http://schemas.microsoft.com/office/powerpoint/2010/main" val="2663648209"/>
+      </p:ext>
+    </p:extLst>
+  </p:cSld>
+  <p:clrMapOvr>
+    <a:masterClrMapping/>
+  </p:clrMapOvr>
+  <p:timing>
+    <p:tnLst>
+      <p:par>
+        <p:cTn id="1" dur="indefinite" restart="never" nodeType="tmRoot">
+          <p:childTnLst>
+            <p:seq>
+              <p:cTn id="2" dur="indefinite" nodeType="mainSeq"/>
+              <p:prevCondLst>
+                <p:cond evt="onPrev" delay="0">
+                  <p:tgtEl>
+                    <p:sldTgt/>
+                  </p:tgtEl>
+                </p:cond>
+              </p:prevCondLst>
+              <p:nextCondLst>
+                <p:cond evt="onNext" delay="0">
+                  <p:tgtEl>
+                    <p:sldTgt/>
+                  </p:tgtEl>
+                </p:cond>
+              </p:nextCondLst>
+            </p:seq>
+          </p:childTnLst>
+        </p:cTn>
+      </p:par>
+    </p:tnLst>
+  </p:timing>
+</p:sld>
+</file>
+
+<file path=ppt/slides/slide32.xml><?xml version="1.0" encoding="utf-8"?>
+<p:sld xmlns:a="http://schemas.openxmlformats.org/drawingml/2006/main" xmlns:r="http://schemas.openxmlformats.org/officeDocument/2006/relationships" xmlns:p="http://schemas.openxmlformats.org/presentationml/2006/main">
+  <p:cSld>
+    <p:spTree>
+      <p:nvGrpSpPr>
+        <p:cNvPr id="1" name=""/>
+        <p:cNvGrpSpPr/>
+        <p:nvPr/>
+      </p:nvGrpSpPr>
+      <p:grpSpPr>
+        <a:xfrm>
+          <a:off x="0" y="0"/>
+          <a:ext cx="0" cy="0"/>
+          <a:chOff x="0" y="0"/>
+          <a:chExt cx="0" cy="0"/>
+        </a:xfrm>
+      </p:grpSpPr>
+      <p:sp>
+        <p:nvSpPr>
+          <p:cNvPr id="163" name="TextShape 1"/>
+          <p:cNvSpPr txBox="1"/>
+          <p:nvPr/>
+        </p:nvSpPr>
+        <p:spPr>
+          <a:xfrm>
+            <a:off x="838080" y="365040"/>
+            <a:ext cx="10515240" cy="1325160"/>
+          </a:xfrm>
+          <a:prstGeom prst="rect">
+            <a:avLst/>
+          </a:prstGeom>
+          <a:noFill/>
+          <a:ln>
+            <a:noFill/>
+          </a:ln>
+        </p:spPr>
+        <p:txBody>
+          <a:bodyPr anchor="ctr"/>
+          <a:lstStyle/>
+          <a:p>
+            <a:pPr algn="ctr">
+              <a:lnSpc>
+                <a:spcPct val="90000"/>
+              </a:lnSpc>
+            </a:pPr>
+            <a:r>
+              <a:rPr lang="en-US" sz="5400" b="1" strike="noStrike" spc="-1" dirty="0">
+                <a:solidFill>
+                  <a:srgbClr val="222222"/>
+                </a:solidFill>
+                <a:latin typeface="Arial"/>
+              </a:rPr>
+              <a:t>OBJ56-J</a:t>
+            </a:r>
+            <a:endParaRPr lang="en-US" sz="5400" b="1" strike="noStrike" spc="-1" dirty="0">
+              <a:solidFill>
+                <a:srgbClr val="000000"/>
+              </a:solidFill>
+              <a:latin typeface="Calibri"/>
+            </a:endParaRPr>
+          </a:p>
+        </p:txBody>
+      </p:sp>
+      <p:sp>
+        <p:nvSpPr>
+          <p:cNvPr id="3" name="TextBox 2">
+            <a:extLst>
+              <a:ext uri="{FF2B5EF4-FFF2-40B4-BE49-F238E27FC236}">
+                <a16:creationId xmlns:a16="http://schemas.microsoft.com/office/drawing/2014/main" id="{AD2F2219-46FB-491F-8B33-9DD02B523751}"/>
+              </a:ext>
+            </a:extLst>
+          </p:cNvPr>
+          <p:cNvSpPr txBox="1"/>
+          <p:nvPr/>
+        </p:nvSpPr>
+        <p:spPr>
+          <a:xfrm>
+            <a:off x="5671456" y="1759308"/>
+            <a:ext cx="2237015" cy="369332"/>
+          </a:xfrm>
+          <a:prstGeom prst="rect">
+            <a:avLst/>
+          </a:prstGeom>
+          <a:noFill/>
+        </p:spPr>
+        <p:txBody>
+          <a:bodyPr wrap="square" rtlCol="0">
+            <a:spAutoFit/>
+          </a:bodyPr>
+          <a:lstStyle/>
+          <a:p>
+            <a:r>
+              <a:rPr lang="en-US" dirty="0"/>
+              <a:t>Compliant</a:t>
+            </a:r>
+          </a:p>
+        </p:txBody>
+      </p:sp>
+      <p:sp>
+        <p:nvSpPr>
+          <p:cNvPr id="7" name="TextBox 6">
+            <a:extLst>
+              <a:ext uri="{FF2B5EF4-FFF2-40B4-BE49-F238E27FC236}">
+                <a16:creationId xmlns:a16="http://schemas.microsoft.com/office/drawing/2014/main" id="{C5AFD54E-DF92-43AF-A310-5AAFCEDD3640}"/>
+              </a:ext>
+            </a:extLst>
+          </p:cNvPr>
+          <p:cNvSpPr txBox="1"/>
+          <p:nvPr/>
+        </p:nvSpPr>
+        <p:spPr>
+          <a:xfrm>
+            <a:off x="0" y="1759308"/>
+            <a:ext cx="2237015" cy="369332"/>
+          </a:xfrm>
+          <a:prstGeom prst="rect">
+            <a:avLst/>
+          </a:prstGeom>
+          <a:noFill/>
+        </p:spPr>
+        <p:txBody>
+          <a:bodyPr wrap="square" rtlCol="0">
+            <a:spAutoFit/>
+          </a:bodyPr>
+          <a:lstStyle/>
+          <a:p>
+            <a:r>
+              <a:rPr lang="en-US" dirty="0"/>
+              <a:t>Noncompliant</a:t>
+            </a:r>
+          </a:p>
+        </p:txBody>
+      </p:sp>
+      <p:pic>
+        <p:nvPicPr>
+          <p:cNvPr id="4" name="Picture 3">
+            <a:extLst>
+              <a:ext uri="{FF2B5EF4-FFF2-40B4-BE49-F238E27FC236}">
+                <a16:creationId xmlns:a16="http://schemas.microsoft.com/office/drawing/2014/main" id="{47791F89-B252-460F-BDFE-A6BB85FAB7CA}"/>
+              </a:ext>
+            </a:extLst>
+          </p:cNvPr>
+          <p:cNvPicPr>
+            <a:picLocks noChangeAspect="1"/>
+          </p:cNvPicPr>
+          <p:nvPr/>
+        </p:nvPicPr>
+        <p:blipFill>
+          <a:blip r:embed="rId2"/>
+          <a:stretch>
+            <a:fillRect/>
+          </a:stretch>
+        </p:blipFill>
+        <p:spPr>
+          <a:xfrm>
+            <a:off x="5725885" y="2197748"/>
+            <a:ext cx="6400187" cy="4165802"/>
+          </a:xfrm>
+          <a:prstGeom prst="rect">
+            <a:avLst/>
+          </a:prstGeom>
+        </p:spPr>
+      </p:pic>
+      <p:pic>
+        <p:nvPicPr>
+          <p:cNvPr id="6" name="Picture 5">
+            <a:extLst>
+              <a:ext uri="{FF2B5EF4-FFF2-40B4-BE49-F238E27FC236}">
+                <a16:creationId xmlns:a16="http://schemas.microsoft.com/office/drawing/2014/main" id="{00521724-36EA-42F6-8894-9706FC253001}"/>
+              </a:ext>
+            </a:extLst>
+          </p:cNvPr>
+          <p:cNvPicPr>
+            <a:picLocks noChangeAspect="1"/>
+          </p:cNvPicPr>
+          <p:nvPr/>
+        </p:nvPicPr>
+        <p:blipFill>
+          <a:blip r:embed="rId3"/>
+          <a:stretch>
+            <a:fillRect/>
+          </a:stretch>
+        </p:blipFill>
+        <p:spPr>
+          <a:xfrm>
+            <a:off x="65926" y="2226003"/>
+            <a:ext cx="4876187" cy="4167914"/>
+          </a:xfrm>
+          <a:prstGeom prst="rect">
+            <a:avLst/>
+          </a:prstGeom>
+        </p:spPr>
+      </p:pic>
+    </p:spTree>
+    <p:extLst>
+      <p:ext uri="{BB962C8B-B14F-4D97-AF65-F5344CB8AC3E}">
+        <p14:creationId xmlns:p14="http://schemas.microsoft.com/office/powerpoint/2010/main" val="1096982514"/>
+      </p:ext>
+    </p:extLst>
+  </p:cSld>
+  <p:clrMapOvr>
+    <a:masterClrMapping/>
+  </p:clrMapOvr>
+  <p:timing>
+    <p:tnLst>
+      <p:par>
+        <p:cTn id="1" dur="indefinite" restart="never" nodeType="tmRoot">
+          <p:childTnLst>
+            <p:seq>
+              <p:cTn id="2" dur="indefinite" nodeType="mainSeq"/>
+              <p:prevCondLst>
+                <p:cond evt="onPrev" delay="0">
+                  <p:tgtEl>
+                    <p:sldTgt/>
+                  </p:tgtEl>
+                </p:cond>
+              </p:prevCondLst>
+              <p:nextCondLst>
+                <p:cond evt="onNext" delay="0">
+                  <p:tgtEl>
+                    <p:sldTgt/>
+                  </p:tgtEl>
+                </p:cond>
+              </p:nextCondLst>
+            </p:seq>
+          </p:childTnLst>
+        </p:cTn>
+      </p:par>
+    </p:tnLst>
+  </p:timing>
+</p:sld>
+</file>
+
+<file path=ppt/slides/slide33.xml><?xml version="1.0" encoding="utf-8"?>
+<p:sld xmlns:a="http://schemas.openxmlformats.org/drawingml/2006/main" xmlns:r="http://schemas.openxmlformats.org/officeDocument/2006/relationships" xmlns:p="http://schemas.openxmlformats.org/presentationml/2006/main">
+  <p:cSld>
+    <p:spTree>
+      <p:nvGrpSpPr>
+        <p:cNvPr id="1" name=""/>
+        <p:cNvGrpSpPr/>
+        <p:nvPr/>
+      </p:nvGrpSpPr>
+      <p:grpSpPr>
+        <a:xfrm>
+          <a:off x="0" y="0"/>
+          <a:ext cx="0" cy="0"/>
+          <a:chOff x="0" y="0"/>
+          <a:chExt cx="0" cy="0"/>
+        </a:xfrm>
+      </p:grpSpPr>
+      <p:sp>
+        <p:nvSpPr>
+          <p:cNvPr id="161" name="TextShape 1"/>
+          <p:cNvSpPr txBox="1"/>
+          <p:nvPr/>
+        </p:nvSpPr>
+        <p:spPr>
+          <a:xfrm>
+            <a:off x="889180" y="446314"/>
+            <a:ext cx="10515240" cy="878846"/>
+          </a:xfrm>
+          <a:prstGeom prst="rect">
+            <a:avLst/>
+          </a:prstGeom>
+          <a:noFill/>
+          <a:ln>
+            <a:noFill/>
+          </a:ln>
+        </p:spPr>
+        <p:txBody>
+          <a:bodyPr anchor="ctr"/>
+          <a:lstStyle/>
+          <a:p>
+            <a:pPr algn="ctr">
+              <a:lnSpc>
+                <a:spcPct val="90000"/>
+              </a:lnSpc>
+            </a:pPr>
+            <a:r>
+              <a:rPr lang="en-US" sz="5400" b="1" strike="noStrike" spc="-1" dirty="0">
+                <a:solidFill>
+                  <a:srgbClr val="222222"/>
+                </a:solidFill>
+                <a:latin typeface="Arial"/>
+              </a:rPr>
+              <a:t>OBJ57-J</a:t>
+            </a:r>
+          </a:p>
+        </p:txBody>
+      </p:sp>
+      <p:sp>
+        <p:nvSpPr>
+          <p:cNvPr id="162" name="TextShape 2"/>
+          <p:cNvSpPr txBox="1"/>
+          <p:nvPr/>
+        </p:nvSpPr>
+        <p:spPr>
+          <a:xfrm>
+            <a:off x="160867" y="1464733"/>
+            <a:ext cx="11971866" cy="4946953"/>
+          </a:xfrm>
+          <a:prstGeom prst="rect">
+            <a:avLst/>
+          </a:prstGeom>
+          <a:solidFill>
+            <a:srgbClr val="FFFFFF"/>
+          </a:solidFill>
+          <a:ln>
+            <a:noFill/>
+          </a:ln>
+        </p:spPr>
+        <p:txBody>
+          <a:bodyPr anchor="ctr"/>
+          <a:lstStyle/>
+          <a:p>
+            <a:pPr>
+              <a:lnSpc>
+                <a:spcPct val="100000"/>
+              </a:lnSpc>
+            </a:pPr>
+            <a:r>
+              <a:rPr lang="en-US" sz="1800" b="1" strike="noStrike" spc="-1" dirty="0">
+                <a:solidFill>
+                  <a:srgbClr val="222222"/>
+                </a:solidFill>
+                <a:latin typeface="Arial"/>
+                <a:ea typeface="DejaVu Sans"/>
+              </a:rPr>
+              <a:t>OBJ57-J</a:t>
+            </a:r>
+            <a:br>
+              <a:rPr lang="en-US" dirty="0"/>
+            </a:br>
+            <a:r>
+              <a:rPr lang="en-US" sz="1800" b="0" u="sng" strike="noStrike" spc="-1" dirty="0">
+                <a:solidFill>
+                  <a:srgbClr val="0563C1"/>
+                </a:solidFill>
+                <a:uFillTx/>
+                <a:latin typeface="Arial"/>
+                <a:ea typeface="DejaVu Sans"/>
+                <a:hlinkClick r:id="rId2"/>
+              </a:rPr>
+              <a:t>https://wiki.sei.cmu.edu/confluence/display/java/OBJ57-J</a:t>
+            </a:r>
+            <a:r>
+              <a:rPr lang="en-US" sz="1800" b="0" u="sng" strike="noStrike" spc="-1" dirty="0">
+                <a:solidFill>
+                  <a:srgbClr val="0563C1"/>
+                </a:solidFill>
+                <a:uFillTx/>
+                <a:latin typeface="Arial"/>
+                <a:ea typeface="DejaVu Sans"/>
+              </a:rPr>
+              <a:t>.+ </a:t>
+            </a:r>
+            <a:r>
+              <a:rPr lang="en-US" sz="1800" b="0" u="sng" strike="noStrike" spc="-1" dirty="0" err="1">
+                <a:solidFill>
+                  <a:srgbClr val="0563C1"/>
+                </a:solidFill>
+                <a:uFillTx/>
+                <a:latin typeface="Arial"/>
+                <a:ea typeface="DejaVu Sans"/>
+              </a:rPr>
+              <a:t>Do+not+rely+on+methods+that+can</a:t>
+            </a:r>
+            <a:r>
+              <a:rPr lang="en-US" sz="1800" b="0" u="sng" strike="noStrike" spc="-1" dirty="0">
+                <a:solidFill>
+                  <a:srgbClr val="0563C1"/>
+                </a:solidFill>
+                <a:uFillTx/>
+                <a:latin typeface="Arial"/>
+                <a:ea typeface="DejaVu Sans"/>
+              </a:rPr>
+              <a:t>+ </a:t>
+            </a:r>
+            <a:r>
+              <a:rPr lang="en-US" sz="1800" b="0" u="sng" strike="noStrike" spc="-1" dirty="0" err="1">
+                <a:solidFill>
+                  <a:srgbClr val="0563C1"/>
+                </a:solidFill>
+                <a:uFillTx/>
+                <a:latin typeface="Arial"/>
+                <a:ea typeface="DejaVu Sans"/>
+              </a:rPr>
+              <a:t>be+overridden</a:t>
+            </a:r>
+            <a:r>
+              <a:rPr lang="en-US" sz="1800" b="0" u="sng" strike="noStrike" spc="-1" dirty="0">
+                <a:solidFill>
+                  <a:srgbClr val="0563C1"/>
+                </a:solidFill>
+                <a:uFillTx/>
+                <a:latin typeface="Arial"/>
+                <a:ea typeface="DejaVu Sans"/>
+              </a:rPr>
+              <a:t>+ </a:t>
+            </a:r>
+            <a:r>
+              <a:rPr lang="en-US" sz="1800" b="0" u="sng" strike="noStrike" spc="-1" dirty="0" err="1">
+                <a:solidFill>
+                  <a:srgbClr val="0563C1"/>
+                </a:solidFill>
+                <a:uFillTx/>
+                <a:latin typeface="Arial"/>
+                <a:ea typeface="DejaVu Sans"/>
+              </a:rPr>
+              <a:t>by+untrusted+code</a:t>
+            </a:r>
+            <a:br>
+              <a:rPr lang="en-US" dirty="0"/>
+            </a:br>
+            <a:endParaRPr lang="en-US" dirty="0"/>
+          </a:p>
+          <a:p>
+            <a:pPr>
+              <a:lnSpc>
+                <a:spcPct val="100000"/>
+              </a:lnSpc>
+            </a:pPr>
+            <a:r>
+              <a:rPr lang="en-US" sz="1800" b="1" strike="noStrike" spc="-1" dirty="0">
+                <a:ea typeface="DejaVu Sans"/>
+              </a:rPr>
+              <a:t>WHAT</a:t>
+            </a:r>
+            <a:r>
+              <a:rPr lang="en-US" sz="1800" b="0" strike="noStrike" spc="-1" dirty="0">
+                <a:ea typeface="DejaVu Sans"/>
+              </a:rPr>
+              <a:t>: Sensitive information organized in key-value format must be saved in a data structure that supports .equals() reference-equality method. Methods such as </a:t>
+            </a:r>
+            <a:r>
+              <a:rPr lang="en-US" sz="1800" b="0" strike="noStrike" spc="-1" dirty="0" err="1">
+                <a:solidFill>
+                  <a:srgbClr val="222222"/>
+                </a:solidFill>
+                <a:latin typeface="Arial"/>
+                <a:ea typeface="DejaVu Sans"/>
+              </a:rPr>
+              <a:t>Object.equals</a:t>
+            </a:r>
+            <a:r>
+              <a:rPr lang="en-US" sz="1800" b="0" strike="noStrike" spc="-1" dirty="0">
+                <a:solidFill>
+                  <a:srgbClr val="222222"/>
+                </a:solidFill>
+                <a:latin typeface="Arial"/>
+                <a:ea typeface="DejaVu Sans"/>
+              </a:rPr>
+              <a:t>(), </a:t>
+            </a:r>
+            <a:r>
+              <a:rPr lang="en-US" sz="1800" b="0" strike="noStrike" spc="-1" dirty="0" err="1">
+                <a:solidFill>
+                  <a:srgbClr val="222222"/>
+                </a:solidFill>
+                <a:latin typeface="Arial"/>
+                <a:ea typeface="DejaVu Sans"/>
+              </a:rPr>
+              <a:t>Object.hashCode</a:t>
+            </a:r>
+            <a:r>
+              <a:rPr lang="en-US" sz="1800" b="0" strike="noStrike" spc="-1" dirty="0">
+                <a:solidFill>
+                  <a:srgbClr val="222222"/>
+                </a:solidFill>
+                <a:latin typeface="Arial"/>
+                <a:ea typeface="DejaVu Sans"/>
+              </a:rPr>
+              <a:t>(), and </a:t>
+            </a:r>
+            <a:r>
+              <a:rPr lang="en-US" sz="1800" b="0" strike="noStrike" spc="-1" dirty="0" err="1">
+                <a:solidFill>
+                  <a:srgbClr val="222222"/>
+                </a:solidFill>
+                <a:latin typeface="Arial"/>
+                <a:ea typeface="DejaVu Sans"/>
+              </a:rPr>
+              <a:t>Thread.run</a:t>
+            </a:r>
+            <a:r>
+              <a:rPr lang="en-US" sz="1800" b="0" strike="noStrike" spc="-1" dirty="0">
+                <a:solidFill>
+                  <a:srgbClr val="222222"/>
+                </a:solidFill>
+                <a:latin typeface="Arial"/>
+                <a:ea typeface="DejaVu Sans"/>
+              </a:rPr>
+              <a:t>() must be a part of immutable class.</a:t>
+            </a:r>
+            <a:br>
+              <a:rPr lang="en-US" dirty="0"/>
+            </a:br>
+            <a:br>
+              <a:rPr lang="en-US" dirty="0"/>
+            </a:br>
+            <a:r>
+              <a:rPr lang="en-US" sz="1800" b="1" strike="noStrike" spc="-1" dirty="0">
+                <a:solidFill>
+                  <a:srgbClr val="222222"/>
+                </a:solidFill>
+                <a:latin typeface="Arial"/>
+                <a:ea typeface="DejaVu Sans"/>
+              </a:rPr>
+              <a:t>WHY</a:t>
+            </a:r>
+            <a:r>
+              <a:rPr lang="en-US" sz="1800" b="0" strike="noStrike" spc="-1" dirty="0">
+                <a:solidFill>
+                  <a:srgbClr val="222222"/>
+                </a:solidFill>
+                <a:latin typeface="Arial"/>
+                <a:ea typeface="DejaVu Sans"/>
+              </a:rPr>
+              <a:t>: Untrusted code can misuse APIs provided by trusted code to override methods such as </a:t>
+            </a:r>
+            <a:r>
+              <a:rPr lang="en-US" sz="1800" b="0" strike="noStrike" spc="-1" dirty="0" err="1">
+                <a:solidFill>
+                  <a:srgbClr val="222222"/>
+                </a:solidFill>
+                <a:latin typeface="Arial"/>
+                <a:ea typeface="DejaVu Sans"/>
+              </a:rPr>
+              <a:t>Object.equals</a:t>
+            </a:r>
+            <a:r>
+              <a:rPr lang="en-US" sz="1800" b="0" strike="noStrike" spc="-1" dirty="0">
+                <a:solidFill>
+                  <a:srgbClr val="222222"/>
+                </a:solidFill>
+                <a:latin typeface="Arial"/>
+                <a:ea typeface="DejaVu Sans"/>
+              </a:rPr>
+              <a:t>(), </a:t>
+            </a:r>
+            <a:r>
+              <a:rPr lang="en-US" sz="1800" b="0" strike="noStrike" spc="-1" dirty="0" err="1">
+                <a:solidFill>
+                  <a:srgbClr val="222222"/>
+                </a:solidFill>
+                <a:latin typeface="Arial"/>
+                <a:ea typeface="DejaVu Sans"/>
+              </a:rPr>
+              <a:t>Object.hashCode</a:t>
+            </a:r>
+            <a:r>
+              <a:rPr lang="en-US" sz="1800" b="0" strike="noStrike" spc="-1" dirty="0">
+                <a:solidFill>
+                  <a:srgbClr val="222222"/>
+                </a:solidFill>
+                <a:latin typeface="Arial"/>
+                <a:ea typeface="DejaVu Sans"/>
+              </a:rPr>
+              <a:t>(), and </a:t>
+            </a:r>
+            <a:r>
+              <a:rPr lang="en-US" sz="1800" b="0" strike="noStrike" spc="-1" dirty="0" err="1">
+                <a:solidFill>
+                  <a:srgbClr val="222222"/>
+                </a:solidFill>
+                <a:latin typeface="Arial"/>
+                <a:ea typeface="DejaVu Sans"/>
+              </a:rPr>
+              <a:t>Thread.run</a:t>
+            </a:r>
+            <a:r>
+              <a:rPr lang="en-US" sz="1800" b="0" strike="noStrike" spc="-1" dirty="0">
+                <a:solidFill>
+                  <a:srgbClr val="222222"/>
+                </a:solidFill>
+                <a:latin typeface="Arial"/>
+                <a:ea typeface="DejaVu Sans"/>
+              </a:rPr>
+              <a:t>(). These methods are valuable targets because they are commonly used behind the scenes and may interact with components in a way that is not easily discernible.</a:t>
+            </a:r>
+            <a:br>
+              <a:rPr lang="en-US" dirty="0"/>
+            </a:br>
+            <a:br>
+              <a:rPr lang="en-US" dirty="0"/>
+            </a:br>
+            <a:r>
+              <a:rPr lang="en-US" sz="1800" b="1" strike="noStrike" spc="-1" dirty="0">
+                <a:solidFill>
+                  <a:srgbClr val="222222"/>
+                </a:solidFill>
+                <a:latin typeface="Arial"/>
+                <a:ea typeface="DejaVu Sans"/>
+              </a:rPr>
+              <a:t>HOW</a:t>
+            </a:r>
+            <a:r>
+              <a:rPr lang="en-US" sz="1800" b="0" strike="noStrike" spc="-1" dirty="0">
+                <a:solidFill>
+                  <a:srgbClr val="222222"/>
+                </a:solidFill>
+                <a:latin typeface="Arial"/>
+                <a:ea typeface="DejaVu Sans"/>
+              </a:rPr>
+              <a:t>: To create compliant solution the </a:t>
+            </a:r>
+            <a:r>
+              <a:rPr lang="en-US" sz="1800" b="0" strike="noStrike" spc="-1" dirty="0" err="1">
+                <a:solidFill>
+                  <a:srgbClr val="222222"/>
+                </a:solidFill>
+                <a:latin typeface="Arial"/>
+                <a:ea typeface="DejaVu Sans"/>
+              </a:rPr>
+              <a:t>datastructure</a:t>
+            </a:r>
+            <a:r>
+              <a:rPr lang="en-US" sz="1800" b="0" strike="noStrike" spc="-1" dirty="0">
+                <a:solidFill>
+                  <a:srgbClr val="222222"/>
+                </a:solidFill>
+                <a:latin typeface="Arial"/>
+                <a:ea typeface="DejaVu Sans"/>
+              </a:rPr>
+              <a:t> </a:t>
+            </a:r>
+            <a:r>
+              <a:rPr lang="en-US" sz="1800" b="0" strike="noStrike" spc="-1" dirty="0" err="1">
+                <a:solidFill>
+                  <a:srgbClr val="222222"/>
+                </a:solidFill>
+                <a:latin typeface="Arial"/>
+                <a:ea typeface="DejaVu Sans"/>
+              </a:rPr>
+              <a:t>IdentityHashMap</a:t>
+            </a:r>
+            <a:r>
+              <a:rPr lang="en-US" spc="-1" dirty="0">
+                <a:solidFill>
+                  <a:srgbClr val="222222"/>
+                </a:solidFill>
+                <a:latin typeface="Arial"/>
+                <a:ea typeface="DejaVu Sans"/>
+              </a:rPr>
+              <a:t> must</a:t>
+            </a:r>
+            <a:r>
+              <a:rPr lang="en-US" sz="1800" b="0" strike="noStrike" spc="-1" dirty="0">
+                <a:solidFill>
+                  <a:srgbClr val="222222"/>
+                </a:solidFill>
+                <a:latin typeface="Arial"/>
+                <a:ea typeface="DejaVu Sans"/>
+              </a:rPr>
+              <a:t> be utilized instead of HashMap to store sensitive key value pairs since it uses reference equality in place of object-equality. An effective use of </a:t>
+            </a:r>
+            <a:r>
+              <a:rPr lang="en-US" sz="1800" b="0" u="sng" strike="noStrike" spc="-1" dirty="0">
+                <a:solidFill>
+                  <a:srgbClr val="222222"/>
+                </a:solidFill>
+                <a:highlight>
+                  <a:srgbClr val="FFFF00"/>
+                </a:highlight>
+                <a:latin typeface="Arial"/>
+                <a:ea typeface="DejaVu Sans"/>
+              </a:rPr>
+              <a:t>final</a:t>
+            </a:r>
+            <a:r>
+              <a:rPr lang="en-US" sz="1800" b="0" strike="noStrike" spc="-1" dirty="0">
+                <a:solidFill>
+                  <a:srgbClr val="222222"/>
+                </a:solidFill>
+                <a:latin typeface="Arial"/>
+                <a:ea typeface="DejaVu Sans"/>
+              </a:rPr>
+              <a:t> keyword protects class methods from being overridden and misused.</a:t>
+            </a:r>
+          </a:p>
+        </p:txBody>
+      </p:sp>
+    </p:spTree>
+    <p:extLst>
+      <p:ext uri="{BB962C8B-B14F-4D97-AF65-F5344CB8AC3E}">
+        <p14:creationId xmlns:p14="http://schemas.microsoft.com/office/powerpoint/2010/main" val="1628070724"/>
+      </p:ext>
+    </p:extLst>
+  </p:cSld>
+  <p:clrMapOvr>
+    <a:masterClrMapping/>
+  </p:clrMapOvr>
+  <p:timing>
+    <p:tnLst>
+      <p:par>
+        <p:cTn id="1" dur="indefinite" restart="never" nodeType="tmRoot">
+          <p:childTnLst>
+            <p:seq>
+              <p:cTn id="2" dur="indefinite" nodeType="mainSeq"/>
+              <p:prevCondLst>
+                <p:cond evt="onPrev" delay="0">
+                  <p:tgtEl>
+                    <p:sldTgt/>
+                  </p:tgtEl>
+                </p:cond>
+              </p:prevCondLst>
+              <p:nextCondLst>
+                <p:cond evt="onNext" delay="0">
+                  <p:tgtEl>
+                    <p:sldTgt/>
+                  </p:tgtEl>
+                </p:cond>
+              </p:nextCondLst>
+            </p:seq>
+          </p:childTnLst>
+        </p:cTn>
+      </p:par>
+    </p:tnLst>
+  </p:timing>
+</p:sld>
+</file>
+
+<file path=ppt/slides/slide34.xml><?xml version="1.0" encoding="utf-8"?>
+<p:sld xmlns:a="http://schemas.openxmlformats.org/drawingml/2006/main" xmlns:r="http://schemas.openxmlformats.org/officeDocument/2006/relationships" xmlns:p="http://schemas.openxmlformats.org/presentationml/2006/main">
+  <p:cSld>
+    <p:spTree>
+      <p:nvGrpSpPr>
+        <p:cNvPr id="1" name=""/>
+        <p:cNvGrpSpPr/>
+        <p:nvPr/>
+      </p:nvGrpSpPr>
+      <p:grpSpPr>
+        <a:xfrm>
+          <a:off x="0" y="0"/>
+          <a:ext cx="0" cy="0"/>
+          <a:chOff x="0" y="0"/>
+          <a:chExt cx="0" cy="0"/>
+        </a:xfrm>
+      </p:grpSpPr>
+      <p:sp>
+        <p:nvSpPr>
+          <p:cNvPr id="163" name="TextShape 1"/>
+          <p:cNvSpPr txBox="1"/>
+          <p:nvPr/>
+        </p:nvSpPr>
+        <p:spPr>
+          <a:xfrm>
+            <a:off x="838080" y="365040"/>
+            <a:ext cx="10515240" cy="1325160"/>
+          </a:xfrm>
+          <a:prstGeom prst="rect">
+            <a:avLst/>
+          </a:prstGeom>
+          <a:noFill/>
+          <a:ln>
+            <a:noFill/>
+          </a:ln>
+        </p:spPr>
+        <p:txBody>
+          <a:bodyPr anchor="ctr"/>
+          <a:lstStyle/>
+          <a:p>
+            <a:pPr algn="ctr">
+              <a:lnSpc>
+                <a:spcPct val="90000"/>
+              </a:lnSpc>
+            </a:pPr>
+            <a:r>
+              <a:rPr lang="en-US" sz="5400" b="1" strike="noStrike" spc="-1" dirty="0">
+                <a:solidFill>
+                  <a:srgbClr val="222222"/>
+                </a:solidFill>
+                <a:latin typeface="Arial"/>
+              </a:rPr>
+              <a:t>OBJ57-J</a:t>
+            </a:r>
+            <a:endParaRPr lang="en-US" sz="5400" b="1" strike="noStrike" spc="-1" dirty="0">
+              <a:solidFill>
+                <a:srgbClr val="000000"/>
+              </a:solidFill>
+              <a:latin typeface="Calibri"/>
+            </a:endParaRPr>
+          </a:p>
+        </p:txBody>
+      </p:sp>
+      <p:sp>
+        <p:nvSpPr>
+          <p:cNvPr id="3" name="TextBox 2">
+            <a:extLst>
+              <a:ext uri="{FF2B5EF4-FFF2-40B4-BE49-F238E27FC236}">
+                <a16:creationId xmlns:a16="http://schemas.microsoft.com/office/drawing/2014/main" id="{AD2F2219-46FB-491F-8B33-9DD02B523751}"/>
+              </a:ext>
+            </a:extLst>
+          </p:cNvPr>
+          <p:cNvSpPr txBox="1"/>
+          <p:nvPr/>
+        </p:nvSpPr>
+        <p:spPr>
+          <a:xfrm>
+            <a:off x="5370672" y="1747602"/>
+            <a:ext cx="2237015" cy="369332"/>
+          </a:xfrm>
+          <a:prstGeom prst="rect">
+            <a:avLst/>
+          </a:prstGeom>
+          <a:noFill/>
+        </p:spPr>
+        <p:txBody>
+          <a:bodyPr wrap="square" rtlCol="0">
+            <a:spAutoFit/>
+          </a:bodyPr>
+          <a:lstStyle/>
+          <a:p>
+            <a:r>
+              <a:rPr lang="en-US" dirty="0"/>
+              <a:t>Compliant</a:t>
+            </a:r>
+          </a:p>
+        </p:txBody>
+      </p:sp>
+      <p:sp>
+        <p:nvSpPr>
+          <p:cNvPr id="7" name="TextBox 6">
+            <a:extLst>
+              <a:ext uri="{FF2B5EF4-FFF2-40B4-BE49-F238E27FC236}">
+                <a16:creationId xmlns:a16="http://schemas.microsoft.com/office/drawing/2014/main" id="{C5AFD54E-DF92-43AF-A310-5AAFCEDD3640}"/>
+              </a:ext>
+            </a:extLst>
+          </p:cNvPr>
+          <p:cNvSpPr txBox="1"/>
+          <p:nvPr/>
+        </p:nvSpPr>
+        <p:spPr>
+          <a:xfrm>
+            <a:off x="52217" y="1749556"/>
+            <a:ext cx="2237015" cy="369332"/>
+          </a:xfrm>
+          <a:prstGeom prst="rect">
+            <a:avLst/>
+          </a:prstGeom>
+          <a:noFill/>
+        </p:spPr>
+        <p:txBody>
+          <a:bodyPr wrap="square" rtlCol="0">
+            <a:spAutoFit/>
+          </a:bodyPr>
+          <a:lstStyle/>
+          <a:p>
+            <a:r>
+              <a:rPr lang="en-US" dirty="0"/>
+              <a:t>Noncompliant</a:t>
+            </a:r>
+          </a:p>
+        </p:txBody>
+      </p:sp>
+      <p:pic>
+        <p:nvPicPr>
+          <p:cNvPr id="5" name="Picture 4">
+            <a:extLst>
+              <a:ext uri="{FF2B5EF4-FFF2-40B4-BE49-F238E27FC236}">
+                <a16:creationId xmlns:a16="http://schemas.microsoft.com/office/drawing/2014/main" id="{FDE78040-ADE5-44E3-925C-B24B2432AB41}"/>
+              </a:ext>
+            </a:extLst>
+          </p:cNvPr>
+          <p:cNvPicPr>
+            <a:picLocks noChangeAspect="1"/>
+          </p:cNvPicPr>
+          <p:nvPr/>
+        </p:nvPicPr>
+        <p:blipFill rotWithShape="1">
+          <a:blip r:embed="rId2"/>
+          <a:srcRect b="43101"/>
+          <a:stretch/>
+        </p:blipFill>
+        <p:spPr>
+          <a:xfrm>
+            <a:off x="5378244" y="2219000"/>
+            <a:ext cx="6761539" cy="608670"/>
+          </a:xfrm>
+          <a:prstGeom prst="rect">
+            <a:avLst/>
+          </a:prstGeom>
+        </p:spPr>
+      </p:pic>
+      <p:pic>
+        <p:nvPicPr>
+          <p:cNvPr id="11" name="Picture 10">
+            <a:extLst>
+              <a:ext uri="{FF2B5EF4-FFF2-40B4-BE49-F238E27FC236}">
+                <a16:creationId xmlns:a16="http://schemas.microsoft.com/office/drawing/2014/main" id="{2FD53090-92EC-4DD5-8E78-B6650E538295}"/>
+              </a:ext>
+            </a:extLst>
+          </p:cNvPr>
+          <p:cNvPicPr>
+            <a:picLocks noChangeAspect="1"/>
+          </p:cNvPicPr>
+          <p:nvPr/>
+        </p:nvPicPr>
+        <p:blipFill>
+          <a:blip r:embed="rId3"/>
+          <a:stretch>
+            <a:fillRect/>
+          </a:stretch>
+        </p:blipFill>
+        <p:spPr>
+          <a:xfrm>
+            <a:off x="5370672" y="4197917"/>
+            <a:ext cx="3286125" cy="1466850"/>
+          </a:xfrm>
+          <a:prstGeom prst="rect">
+            <a:avLst/>
+          </a:prstGeom>
+        </p:spPr>
+      </p:pic>
+      <p:pic>
+        <p:nvPicPr>
+          <p:cNvPr id="13" name="Picture 12">
+            <a:extLst>
+              <a:ext uri="{FF2B5EF4-FFF2-40B4-BE49-F238E27FC236}">
+                <a16:creationId xmlns:a16="http://schemas.microsoft.com/office/drawing/2014/main" id="{94A569B5-B2AD-4D47-9054-ACD02782F37C}"/>
+              </a:ext>
+            </a:extLst>
+          </p:cNvPr>
+          <p:cNvPicPr>
+            <a:picLocks noChangeAspect="1"/>
+          </p:cNvPicPr>
+          <p:nvPr/>
+        </p:nvPicPr>
+        <p:blipFill>
+          <a:blip r:embed="rId4"/>
+          <a:stretch>
+            <a:fillRect/>
+          </a:stretch>
+        </p:blipFill>
+        <p:spPr>
+          <a:xfrm>
+            <a:off x="52217" y="4197917"/>
+            <a:ext cx="4540250" cy="1466850"/>
+          </a:xfrm>
+          <a:prstGeom prst="rect">
+            <a:avLst/>
+          </a:prstGeom>
+        </p:spPr>
+      </p:pic>
+      <p:pic>
+        <p:nvPicPr>
+          <p:cNvPr id="15" name="Picture 14">
+            <a:extLst>
+              <a:ext uri="{FF2B5EF4-FFF2-40B4-BE49-F238E27FC236}">
+                <a16:creationId xmlns:a16="http://schemas.microsoft.com/office/drawing/2014/main" id="{E8326ACA-8081-499A-8D28-B8A7D9532BDD}"/>
+              </a:ext>
+            </a:extLst>
+          </p:cNvPr>
+          <p:cNvPicPr>
+            <a:picLocks noChangeAspect="1"/>
+          </p:cNvPicPr>
+          <p:nvPr/>
+        </p:nvPicPr>
+        <p:blipFill>
+          <a:blip r:embed="rId5"/>
+          <a:stretch>
+            <a:fillRect/>
+          </a:stretch>
+        </p:blipFill>
+        <p:spPr>
+          <a:xfrm>
+            <a:off x="5378244" y="3027891"/>
+            <a:ext cx="3156156" cy="965893"/>
+          </a:xfrm>
+          <a:prstGeom prst="rect">
+            <a:avLst/>
+          </a:prstGeom>
+        </p:spPr>
+      </p:pic>
+      <p:pic>
+        <p:nvPicPr>
+          <p:cNvPr id="17" name="Picture 16">
+            <a:extLst>
+              <a:ext uri="{FF2B5EF4-FFF2-40B4-BE49-F238E27FC236}">
+                <a16:creationId xmlns:a16="http://schemas.microsoft.com/office/drawing/2014/main" id="{07BCA9EC-AA6E-418E-AA2B-AA21756C650B}"/>
+              </a:ext>
+            </a:extLst>
+          </p:cNvPr>
+          <p:cNvPicPr>
+            <a:picLocks noChangeAspect="1"/>
+          </p:cNvPicPr>
+          <p:nvPr/>
+        </p:nvPicPr>
+        <p:blipFill>
+          <a:blip r:embed="rId6"/>
+          <a:stretch>
+            <a:fillRect/>
+          </a:stretch>
+        </p:blipFill>
+        <p:spPr>
+          <a:xfrm>
+            <a:off x="52217" y="3027891"/>
+            <a:ext cx="4007572" cy="969804"/>
+          </a:xfrm>
+          <a:prstGeom prst="rect">
+            <a:avLst/>
+          </a:prstGeom>
+        </p:spPr>
+      </p:pic>
+      <p:pic>
+        <p:nvPicPr>
+          <p:cNvPr id="19" name="Picture 18">
+            <a:extLst>
+              <a:ext uri="{FF2B5EF4-FFF2-40B4-BE49-F238E27FC236}">
+                <a16:creationId xmlns:a16="http://schemas.microsoft.com/office/drawing/2014/main" id="{BEFF1FD8-FFF9-4B80-AC90-6B46C784A639}"/>
+              </a:ext>
+            </a:extLst>
+          </p:cNvPr>
+          <p:cNvPicPr>
+            <a:picLocks noChangeAspect="1"/>
+          </p:cNvPicPr>
+          <p:nvPr/>
+        </p:nvPicPr>
+        <p:blipFill rotWithShape="1">
+          <a:blip r:embed="rId7"/>
+          <a:srcRect r="2367"/>
+          <a:stretch/>
+        </p:blipFill>
+        <p:spPr>
+          <a:xfrm>
+            <a:off x="52217" y="2218999"/>
+            <a:ext cx="5208041" cy="608670"/>
+          </a:xfrm>
+          <a:prstGeom prst="rect">
+            <a:avLst/>
+          </a:prstGeom>
+        </p:spPr>
+      </p:pic>
+    </p:spTree>
+    <p:extLst>
+      <p:ext uri="{BB962C8B-B14F-4D97-AF65-F5344CB8AC3E}">
+        <p14:creationId xmlns:p14="http://schemas.microsoft.com/office/powerpoint/2010/main" val="4165066824"/>
+      </p:ext>
+    </p:extLst>
+  </p:cSld>
+  <p:clrMapOvr>
+    <a:masterClrMapping/>
+  </p:clrMapOvr>
+  <p:timing>
+    <p:tnLst>
+      <p:par>
+        <p:cTn id="1" dur="indefinite" restart="never" nodeType="tmRoot">
+          <p:childTnLst>
+            <p:seq>
+              <p:cTn id="2" dur="indefinite" nodeType="mainSeq"/>
+              <p:prevCondLst>
+                <p:cond evt="onPrev" delay="0">
+                  <p:tgtEl>
+                    <p:sldTgt/>
+                  </p:tgtEl>
+                </p:cond>
+              </p:prevCondLst>
+              <p:nextCondLst>
+                <p:cond evt="onNext" delay="0">
+                  <p:tgtEl>
+                    <p:sldTgt/>
+                  </p:tgtEl>
+                </p:cond>
+              </p:nextCondLst>
+            </p:seq>
+          </p:childTnLst>
+        </p:cTn>
+      </p:par>
+    </p:tnLst>
+  </p:timing>
+</p:sld>
+</file>
+
 <file path=ppt/slides/slide4.xml><?xml version="1.0" encoding="utf-8"?>
 <p:sld xmlns:a="http://schemas.openxmlformats.org/drawingml/2006/main" xmlns:r="http://schemas.openxmlformats.org/officeDocument/2006/relationships" xmlns:p="http://schemas.openxmlformats.org/presentationml/2006/main">
   <p:cSld>
@@ -17850,7 +20355,7 @@
                 <a:latin typeface="Arial"/>
                 <a:ea typeface="DejaVu Sans"/>
               </a:rPr>
-              <a:t>DS13-J (Deprecated moved to STR04-J)</a:t>
+              <a:t>IDS13-J (Deprecated moved to STR04-J)</a:t>
             </a:r>
             <a:br>
               <a:rPr dirty="0"/>
@@ -21721,7 +24226,7 @@
           </a:bodyPr>
           <a:lstStyle/>
           <a:p>
-            <a:pPr marL="228600" indent="-227880">
+            <a:pPr marL="720">
               <a:lnSpc>
                 <a:spcPct val="90000"/>
               </a:lnSpc>
@@ -21731,8 +24236,6 @@
               <a:buClr>
                 <a:srgbClr val="000000"/>
               </a:buClr>
-              <a:buFont typeface="Arial"/>
-              <a:buChar char="•"/>
             </a:pPr>
             <a:r>
               <a:rPr lang="en-US" sz="2000" b="1" strike="noStrike" spc="-1" dirty="0">

</xml_diff>